<commit_message>
update mission and fitness
</commit_message>
<xml_diff>
--- a/doc/classes.pptx
+++ b/doc/classes.pptx
@@ -6,6 +6,7 @@
   </p:sldMasterIdLst>
   <p:sldIdLst>
     <p:sldId id="256" r:id="rId2"/>
+    <p:sldId id="257" r:id="rId3"/>
   </p:sldIdLst>
   <p:sldSz cx="12192000" cy="6858000"/>
   <p:notesSz cx="6858000" cy="9144000"/>
@@ -104,6 +105,11 @@
       </a:defRPr>
     </a:lvl9pPr>
   </p:defaultTextStyle>
+  <p:extLst>
+    <p:ext uri="{EFAFB233-063F-42B5-8137-9DF3F51BA10A}">
+      <p15:sldGuideLst xmlns:p15="http://schemas.microsoft.com/office/powerpoint/2012/main"/>
+    </p:ext>
+  </p:extLst>
 </p:presentation>
 </file>
 
@@ -254,7 +260,7 @@
           <a:p>
             <a:fld id="{F6D35F03-8767-45FF-9338-48A69541B4C9}" type="datetimeFigureOut">
               <a:rPr lang="en-US" smtClean="0"/>
-              <a:t>3/19/2020</a:t>
+              <a:t>3/25/2020</a:t>
             </a:fld>
             <a:endParaRPr lang="en-US"/>
           </a:p>
@@ -452,7 +458,7 @@
           <a:p>
             <a:fld id="{F6D35F03-8767-45FF-9338-48A69541B4C9}" type="datetimeFigureOut">
               <a:rPr lang="en-US" smtClean="0"/>
-              <a:t>3/19/2020</a:t>
+              <a:t>3/25/2020</a:t>
             </a:fld>
             <a:endParaRPr lang="en-US"/>
           </a:p>
@@ -660,7 +666,7 @@
           <a:p>
             <a:fld id="{F6D35F03-8767-45FF-9338-48A69541B4C9}" type="datetimeFigureOut">
               <a:rPr lang="en-US" smtClean="0"/>
-              <a:t>3/19/2020</a:t>
+              <a:t>3/25/2020</a:t>
             </a:fld>
             <a:endParaRPr lang="en-US"/>
           </a:p>
@@ -858,7 +864,7 @@
           <a:p>
             <a:fld id="{F6D35F03-8767-45FF-9338-48A69541B4C9}" type="datetimeFigureOut">
               <a:rPr lang="en-US" smtClean="0"/>
-              <a:t>3/19/2020</a:t>
+              <a:t>3/25/2020</a:t>
             </a:fld>
             <a:endParaRPr lang="en-US"/>
           </a:p>
@@ -1133,7 +1139,7 @@
           <a:p>
             <a:fld id="{F6D35F03-8767-45FF-9338-48A69541B4C9}" type="datetimeFigureOut">
               <a:rPr lang="en-US" smtClean="0"/>
-              <a:t>3/19/2020</a:t>
+              <a:t>3/25/2020</a:t>
             </a:fld>
             <a:endParaRPr lang="en-US"/>
           </a:p>
@@ -1398,7 +1404,7 @@
           <a:p>
             <a:fld id="{F6D35F03-8767-45FF-9338-48A69541B4C9}" type="datetimeFigureOut">
               <a:rPr lang="en-US" smtClean="0"/>
-              <a:t>3/19/2020</a:t>
+              <a:t>3/25/2020</a:t>
             </a:fld>
             <a:endParaRPr lang="en-US"/>
           </a:p>
@@ -1810,7 +1816,7 @@
           <a:p>
             <a:fld id="{F6D35F03-8767-45FF-9338-48A69541B4C9}" type="datetimeFigureOut">
               <a:rPr lang="en-US" smtClean="0"/>
-              <a:t>3/19/2020</a:t>
+              <a:t>3/25/2020</a:t>
             </a:fld>
             <a:endParaRPr lang="en-US"/>
           </a:p>
@@ -1951,7 +1957,7 @@
           <a:p>
             <a:fld id="{F6D35F03-8767-45FF-9338-48A69541B4C9}" type="datetimeFigureOut">
               <a:rPr lang="en-US" smtClean="0"/>
-              <a:t>3/19/2020</a:t>
+              <a:t>3/25/2020</a:t>
             </a:fld>
             <a:endParaRPr lang="en-US"/>
           </a:p>
@@ -2064,7 +2070,7 @@
           <a:p>
             <a:fld id="{F6D35F03-8767-45FF-9338-48A69541B4C9}" type="datetimeFigureOut">
               <a:rPr lang="en-US" smtClean="0"/>
-              <a:t>3/19/2020</a:t>
+              <a:t>3/25/2020</a:t>
             </a:fld>
             <a:endParaRPr lang="en-US"/>
           </a:p>
@@ -2375,7 +2381,7 @@
           <a:p>
             <a:fld id="{F6D35F03-8767-45FF-9338-48A69541B4C9}" type="datetimeFigureOut">
               <a:rPr lang="en-US" smtClean="0"/>
-              <a:t>3/19/2020</a:t>
+              <a:t>3/25/2020</a:t>
             </a:fld>
             <a:endParaRPr lang="en-US"/>
           </a:p>
@@ -2663,7 +2669,7 @@
           <a:p>
             <a:fld id="{F6D35F03-8767-45FF-9338-48A69541B4C9}" type="datetimeFigureOut">
               <a:rPr lang="en-US" smtClean="0"/>
-              <a:t>3/19/2020</a:t>
+              <a:t>3/25/2020</a:t>
             </a:fld>
             <a:endParaRPr lang="en-US"/>
           </a:p>
@@ -2904,7 +2910,7 @@
           <a:p>
             <a:fld id="{F6D35F03-8767-45FF-9338-48A69541B4C9}" type="datetimeFigureOut">
               <a:rPr lang="en-US" smtClean="0"/>
-              <a:t>3/19/2020</a:t>
+              <a:t>3/25/2020</a:t>
             </a:fld>
             <a:endParaRPr lang="en-US"/>
           </a:p>
@@ -3323,10 +3329,10 @@
       </p:grpSpPr>
       <p:sp>
         <p:nvSpPr>
-          <p:cNvPr id="4" name="Rectangle 3">
-            <a:extLst>
-              <a:ext uri="{FF2B5EF4-FFF2-40B4-BE49-F238E27FC236}">
-                <a16:creationId xmlns:a16="http://schemas.microsoft.com/office/drawing/2014/main" id="{F6856C72-6980-4D91-B35D-A1899AAC4B9C}"/>
+          <p:cNvPr id="31" name="Rectangle 30">
+            <a:extLst>
+              <a:ext uri="{FF2B5EF4-FFF2-40B4-BE49-F238E27FC236}">
+                <a16:creationId xmlns:a16="http://schemas.microsoft.com/office/drawing/2014/main" id="{070BF843-2E62-4541-B9D9-70BD6B206A27}"/>
               </a:ext>
             </a:extLst>
           </p:cNvPr>
@@ -3335,7 +3341,201 @@
         </p:nvSpPr>
         <p:spPr>
           <a:xfrm>
-            <a:off x="3540159" y="1403223"/>
+            <a:off x="523990" y="4471863"/>
+            <a:ext cx="2212848" cy="1143122"/>
+          </a:xfrm>
+          <a:prstGeom prst="rect">
+            <a:avLst/>
+          </a:prstGeom>
+          <a:solidFill>
+            <a:schemeClr val="bg1"/>
+          </a:solidFill>
+        </p:spPr>
+        <p:style>
+          <a:lnRef idx="2">
+            <a:schemeClr val="accent2">
+              <a:shade val="50000"/>
+            </a:schemeClr>
+          </a:lnRef>
+          <a:fillRef idx="1">
+            <a:schemeClr val="accent2"/>
+          </a:fillRef>
+          <a:effectRef idx="0">
+            <a:schemeClr val="accent2"/>
+          </a:effectRef>
+          <a:fontRef idx="minor">
+            <a:schemeClr val="lt1"/>
+          </a:fontRef>
+        </p:style>
+        <p:txBody>
+          <a:bodyPr rot="0" spcFirstLastPara="0" vert="horz" wrap="square" lIns="91440" tIns="45720" rIns="91440" bIns="45720" numCol="1" spcCol="0" rtlCol="0" fromWordArt="0" anchor="ctr" anchorCtr="0" forceAA="0" compatLnSpc="1">
+            <a:prstTxWarp prst="textNoShape">
+              <a:avLst/>
+            </a:prstTxWarp>
+            <a:noAutofit/>
+          </a:bodyPr>
+          <a:lstStyle>
+            <a:defPPr>
+              <a:defRPr lang="en-US"/>
+            </a:defPPr>
+            <a:lvl1pPr marL="0" algn="l" defTabSz="914400" rtl="0" eaLnBrk="1" latinLnBrk="0" hangingPunct="1">
+              <a:defRPr sz="1800" kern="1200">
+                <a:solidFill>
+                  <a:schemeClr val="lt1"/>
+                </a:solidFill>
+                <a:latin typeface="+mn-lt"/>
+                <a:ea typeface="+mn-ea"/>
+                <a:cs typeface="+mn-cs"/>
+              </a:defRPr>
+            </a:lvl1pPr>
+            <a:lvl2pPr marL="457200" algn="l" defTabSz="914400" rtl="0" eaLnBrk="1" latinLnBrk="0" hangingPunct="1">
+              <a:defRPr sz="1800" kern="1200">
+                <a:solidFill>
+                  <a:schemeClr val="lt1"/>
+                </a:solidFill>
+                <a:latin typeface="+mn-lt"/>
+                <a:ea typeface="+mn-ea"/>
+                <a:cs typeface="+mn-cs"/>
+              </a:defRPr>
+            </a:lvl2pPr>
+            <a:lvl3pPr marL="914400" algn="l" defTabSz="914400" rtl="0" eaLnBrk="1" latinLnBrk="0" hangingPunct="1">
+              <a:defRPr sz="1800" kern="1200">
+                <a:solidFill>
+                  <a:schemeClr val="lt1"/>
+                </a:solidFill>
+                <a:latin typeface="+mn-lt"/>
+                <a:ea typeface="+mn-ea"/>
+                <a:cs typeface="+mn-cs"/>
+              </a:defRPr>
+            </a:lvl3pPr>
+            <a:lvl4pPr marL="1371600" algn="l" defTabSz="914400" rtl="0" eaLnBrk="1" latinLnBrk="0" hangingPunct="1">
+              <a:defRPr sz="1800" kern="1200">
+                <a:solidFill>
+                  <a:schemeClr val="lt1"/>
+                </a:solidFill>
+                <a:latin typeface="+mn-lt"/>
+                <a:ea typeface="+mn-ea"/>
+                <a:cs typeface="+mn-cs"/>
+              </a:defRPr>
+            </a:lvl4pPr>
+            <a:lvl5pPr marL="1828800" algn="l" defTabSz="914400" rtl="0" eaLnBrk="1" latinLnBrk="0" hangingPunct="1">
+              <a:defRPr sz="1800" kern="1200">
+                <a:solidFill>
+                  <a:schemeClr val="lt1"/>
+                </a:solidFill>
+                <a:latin typeface="+mn-lt"/>
+                <a:ea typeface="+mn-ea"/>
+                <a:cs typeface="+mn-cs"/>
+              </a:defRPr>
+            </a:lvl5pPr>
+            <a:lvl6pPr marL="2286000" algn="l" defTabSz="914400" rtl="0" eaLnBrk="1" latinLnBrk="0" hangingPunct="1">
+              <a:defRPr sz="1800" kern="1200">
+                <a:solidFill>
+                  <a:schemeClr val="lt1"/>
+                </a:solidFill>
+                <a:latin typeface="+mn-lt"/>
+                <a:ea typeface="+mn-ea"/>
+                <a:cs typeface="+mn-cs"/>
+              </a:defRPr>
+            </a:lvl6pPr>
+            <a:lvl7pPr marL="2743200" algn="l" defTabSz="914400" rtl="0" eaLnBrk="1" latinLnBrk="0" hangingPunct="1">
+              <a:defRPr sz="1800" kern="1200">
+                <a:solidFill>
+                  <a:schemeClr val="lt1"/>
+                </a:solidFill>
+                <a:latin typeface="+mn-lt"/>
+                <a:ea typeface="+mn-ea"/>
+                <a:cs typeface="+mn-cs"/>
+              </a:defRPr>
+            </a:lvl7pPr>
+            <a:lvl8pPr marL="3200400" algn="l" defTabSz="914400" rtl="0" eaLnBrk="1" latinLnBrk="0" hangingPunct="1">
+              <a:defRPr sz="1800" kern="1200">
+                <a:solidFill>
+                  <a:schemeClr val="lt1"/>
+                </a:solidFill>
+                <a:latin typeface="+mn-lt"/>
+                <a:ea typeface="+mn-ea"/>
+                <a:cs typeface="+mn-cs"/>
+              </a:defRPr>
+            </a:lvl8pPr>
+            <a:lvl9pPr marL="3657600" algn="l" defTabSz="914400" rtl="0" eaLnBrk="1" latinLnBrk="0" hangingPunct="1">
+              <a:defRPr sz="1800" kern="1200">
+                <a:solidFill>
+                  <a:schemeClr val="lt1"/>
+                </a:solidFill>
+                <a:latin typeface="+mn-lt"/>
+                <a:ea typeface="+mn-ea"/>
+                <a:cs typeface="+mn-cs"/>
+              </a:defRPr>
+            </a:lvl9pPr>
+          </a:lstStyle>
+          <a:p>
+            <a:r>
+              <a:rPr lang="en-US" dirty="0">
+                <a:solidFill>
+                  <a:sysClr val="windowText" lastClr="000000"/>
+                </a:solidFill>
+              </a:rPr>
+              <a:t>Friction</a:t>
+            </a:r>
+          </a:p>
+          <a:p>
+            <a:r>
+              <a:rPr lang="en-US" dirty="0">
+                <a:solidFill>
+                  <a:sysClr val="windowText" lastClr="000000"/>
+                </a:solidFill>
+              </a:rPr>
+              <a:t>Mass</a:t>
+            </a:r>
+          </a:p>
+          <a:p>
+            <a:r>
+              <a:rPr lang="en-US" dirty="0" err="1">
+                <a:solidFill>
+                  <a:sysClr val="windowText" lastClr="000000"/>
+                </a:solidFill>
+              </a:rPr>
+              <a:t>RotationalMass</a:t>
+            </a:r>
+            <a:endParaRPr lang="en-US" dirty="0">
+              <a:solidFill>
+                <a:sysClr val="windowText" lastClr="000000"/>
+              </a:solidFill>
+            </a:endParaRPr>
+          </a:p>
+          <a:p>
+            <a:r>
+              <a:rPr lang="en-US" dirty="0" err="1">
+                <a:solidFill>
+                  <a:sysClr val="windowText" lastClr="000000"/>
+                </a:solidFill>
+              </a:rPr>
+              <a:t>Throttle_to_Thrust</a:t>
+            </a:r>
+            <a:endParaRPr lang="en-US" dirty="0">
+              <a:solidFill>
+                <a:sysClr val="windowText" lastClr="000000"/>
+              </a:solidFill>
+            </a:endParaRPr>
+          </a:p>
+        </p:txBody>
+      </p:sp>
+      <p:sp>
+        <p:nvSpPr>
+          <p:cNvPr id="4" name="Rectangle 3">
+            <a:extLst>
+              <a:ext uri="{FF2B5EF4-FFF2-40B4-BE49-F238E27FC236}">
+                <a16:creationId xmlns:a16="http://schemas.microsoft.com/office/drawing/2014/main" id="{F6856C72-6980-4D91-B35D-A1899AAC4B9C}"/>
+              </a:ext>
+            </a:extLst>
+          </p:cNvPr>
+          <p:cNvSpPr/>
+          <p:nvPr/>
+        </p:nvSpPr>
+        <p:spPr>
+          <a:xfrm>
+            <a:off x="3540159" y="1631822"/>
             <a:ext cx="2212848" cy="448056"/>
           </a:xfrm>
           <a:prstGeom prst="rect">
@@ -3483,7 +3683,7 @@
         </p:nvSpPr>
         <p:spPr>
           <a:xfrm>
-            <a:off x="3540159" y="1967103"/>
+            <a:off x="3540159" y="2195702"/>
             <a:ext cx="2212848" cy="448056"/>
           </a:xfrm>
           <a:prstGeom prst="rect">
@@ -3631,7 +3831,7 @@
         </p:nvSpPr>
         <p:spPr>
           <a:xfrm>
-            <a:off x="3540159" y="2530983"/>
+            <a:off x="3540159" y="2759582"/>
             <a:ext cx="2212848" cy="448056"/>
           </a:xfrm>
           <a:prstGeom prst="rect">
@@ -3779,7 +3979,7 @@
         </p:nvSpPr>
         <p:spPr>
           <a:xfrm>
-            <a:off x="3247551" y="756285"/>
+            <a:off x="3247551" y="984884"/>
             <a:ext cx="2807208" cy="448056"/>
           </a:xfrm>
           <a:prstGeom prst="rect">
@@ -3928,7 +4128,7 @@
         </p:nvSpPr>
         <p:spPr>
           <a:xfrm>
-            <a:off x="3540159" y="3658743"/>
+            <a:off x="3540159" y="3887342"/>
             <a:ext cx="2212848" cy="1188382"/>
           </a:xfrm>
           <a:prstGeom prst="rect">
@@ -4104,7 +4304,7 @@
         </p:nvSpPr>
         <p:spPr>
           <a:xfrm>
-            <a:off x="3540159" y="3094863"/>
+            <a:off x="3540159" y="3323462"/>
             <a:ext cx="2212848" cy="448056"/>
           </a:xfrm>
           <a:prstGeom prst="rect">
@@ -4253,7 +4453,7 @@
         </p:nvSpPr>
         <p:spPr>
           <a:xfrm>
-            <a:off x="3247551" y="756286"/>
+            <a:off x="3247551" y="984885"/>
             <a:ext cx="2807208" cy="4277106"/>
           </a:xfrm>
           <a:prstGeom prst="rect">
@@ -4404,7 +4604,7 @@
         </p:nvSpPr>
         <p:spPr>
           <a:xfrm>
-            <a:off x="3000917" y="67808"/>
+            <a:off x="3000917" y="222122"/>
             <a:ext cx="2212848" cy="448056"/>
           </a:xfrm>
           <a:prstGeom prst="rect">
@@ -4560,7 +4760,7 @@
         </p:nvSpPr>
         <p:spPr>
           <a:xfrm>
-            <a:off x="5477844" y="67808"/>
+            <a:off x="5477844" y="222122"/>
             <a:ext cx="2212848" cy="448056"/>
           </a:xfrm>
           <a:prstGeom prst="rect">
@@ -4716,7 +4916,7 @@
         </p:nvSpPr>
         <p:spPr>
           <a:xfrm>
-            <a:off x="523990" y="67808"/>
+            <a:off x="523990" y="222122"/>
             <a:ext cx="2212848" cy="448056"/>
           </a:xfrm>
           <a:prstGeom prst="rect">
@@ -4872,7 +5072,7 @@
         </p:nvSpPr>
         <p:spPr>
           <a:xfrm>
-            <a:off x="6565472" y="730623"/>
+            <a:off x="6565472" y="959222"/>
             <a:ext cx="2212848" cy="448056"/>
           </a:xfrm>
           <a:prstGeom prst="rect">
@@ -5021,7 +5221,7 @@
         </p:nvSpPr>
         <p:spPr>
           <a:xfrm>
-            <a:off x="9270491" y="3973013"/>
+            <a:off x="9270491" y="4201612"/>
             <a:ext cx="2212848" cy="2506900"/>
           </a:xfrm>
           <a:prstGeom prst="rect">
@@ -5218,7 +5418,7 @@
         </p:nvSpPr>
         <p:spPr>
           <a:xfrm>
-            <a:off x="6565472" y="1178679"/>
+            <a:off x="6565472" y="1407278"/>
             <a:ext cx="2212848" cy="679704"/>
           </a:xfrm>
           <a:prstGeom prst="rect">
@@ -5376,7 +5576,7 @@
         </p:nvSpPr>
         <p:spPr>
           <a:xfrm>
-            <a:off x="9270491" y="3520305"/>
+            <a:off x="9270491" y="3748904"/>
             <a:ext cx="2212848" cy="448056"/>
           </a:xfrm>
           <a:prstGeom prst="rect">
@@ -5525,7 +5725,7 @@
         </p:nvSpPr>
         <p:spPr>
           <a:xfrm>
-            <a:off x="6565472" y="5425749"/>
+            <a:off x="6565472" y="5788945"/>
             <a:ext cx="2212848" cy="924026"/>
           </a:xfrm>
           <a:prstGeom prst="rect">
@@ -5692,7 +5892,7 @@
         </p:nvSpPr>
         <p:spPr>
           <a:xfrm>
-            <a:off x="6565472" y="3968361"/>
+            <a:off x="6565472" y="4331557"/>
             <a:ext cx="2212848" cy="448056"/>
           </a:xfrm>
           <a:prstGeom prst="rect">
@@ -5840,7 +6040,7 @@
         </p:nvSpPr>
         <p:spPr>
           <a:xfrm>
-            <a:off x="6565472" y="4416417"/>
+            <a:off x="6565472" y="4779613"/>
             <a:ext cx="2212848" cy="1009331"/>
           </a:xfrm>
           <a:prstGeom prst="rect">
@@ -6030,7 +6230,7 @@
         </p:nvSpPr>
         <p:spPr>
           <a:xfrm>
-            <a:off x="9270491" y="730623"/>
+            <a:off x="9270491" y="959222"/>
             <a:ext cx="2212848" cy="448056"/>
           </a:xfrm>
           <a:prstGeom prst="rect">
@@ -6178,7 +6378,7 @@
         </p:nvSpPr>
         <p:spPr>
           <a:xfrm>
-            <a:off x="9270491" y="1178679"/>
+            <a:off x="9270491" y="1407278"/>
             <a:ext cx="2212848" cy="1519320"/>
           </a:xfrm>
           <a:prstGeom prst="rect">
@@ -6414,7 +6614,7 @@
         </p:nvSpPr>
         <p:spPr>
           <a:xfrm>
-            <a:off x="9270491" y="2698000"/>
+            <a:off x="9270491" y="2926599"/>
             <a:ext cx="2212848" cy="583814"/>
           </a:xfrm>
           <a:prstGeom prst="rect">
@@ -6597,7 +6797,7 @@
         </p:nvSpPr>
         <p:spPr>
           <a:xfrm>
-            <a:off x="6565472" y="2057997"/>
+            <a:off x="6565472" y="2349247"/>
             <a:ext cx="2212848" cy="448056"/>
           </a:xfrm>
           <a:prstGeom prst="rect">
@@ -6746,7 +6946,7 @@
         </p:nvSpPr>
         <p:spPr>
           <a:xfrm>
-            <a:off x="6565472" y="2505227"/>
+            <a:off x="6565472" y="2796477"/>
             <a:ext cx="2212848" cy="679703"/>
           </a:xfrm>
           <a:prstGeom prst="rect">
@@ -6924,7 +7124,7 @@
         </p:nvSpPr>
         <p:spPr>
           <a:xfrm>
-            <a:off x="6565472" y="3184932"/>
+            <a:off x="6565472" y="3476182"/>
             <a:ext cx="2212848" cy="583814"/>
           </a:xfrm>
           <a:prstGeom prst="rect">
@@ -7084,7 +7284,7 @@
         </p:nvSpPr>
         <p:spPr>
           <a:xfrm>
-            <a:off x="523990" y="756285"/>
+            <a:off x="523990" y="984884"/>
             <a:ext cx="2212848" cy="448056"/>
           </a:xfrm>
           <a:prstGeom prst="rect">
@@ -7232,7 +7432,7 @@
         </p:nvSpPr>
         <p:spPr>
           <a:xfrm>
-            <a:off x="523990" y="1178679"/>
+            <a:off x="523990" y="1407278"/>
             <a:ext cx="2212848" cy="2642190"/>
           </a:xfrm>
           <a:prstGeom prst="rect">
@@ -7548,8 +7748,8 @@
         </p:nvSpPr>
         <p:spPr>
           <a:xfrm>
-            <a:off x="523990" y="5379186"/>
-            <a:ext cx="2656840" cy="448056"/>
+            <a:off x="523991" y="5611385"/>
+            <a:ext cx="2212847" cy="448056"/>
           </a:xfrm>
           <a:prstGeom prst="rect">
             <a:avLst/>
@@ -7675,19 +7875,19 @@
           </a:lstStyle>
           <a:p>
             <a:r>
-              <a:rPr lang="en-US" dirty="0" err="1"/>
+              <a:rPr lang="en-US" sz="1500" dirty="0" err="1"/>
               <a:t>update_position</a:t>
             </a:r>
             <a:r>
-              <a:rPr lang="en-US" dirty="0"/>
+              <a:rPr lang="en-US" sz="1500" dirty="0"/>
               <a:t>(</a:t>
             </a:r>
             <a:r>
-              <a:rPr lang="en-US" dirty="0" err="1"/>
+              <a:rPr lang="en-US" sz="1500" dirty="0" err="1"/>
               <a:t>dt,n,vxy</a:t>
             </a:r>
             <a:r>
-              <a:rPr lang="en-US" dirty="0"/>
+              <a:rPr lang="en-US" sz="1500" dirty="0"/>
               <a:t>)</a:t>
             </a:r>
           </a:p>
@@ -7707,7 +7907,7 @@
         </p:nvSpPr>
         <p:spPr>
           <a:xfrm>
-            <a:off x="523990" y="3795207"/>
+            <a:off x="523990" y="4023806"/>
             <a:ext cx="2212848" cy="448056"/>
           </a:xfrm>
           <a:prstGeom prst="rect">
@@ -7843,10 +8043,10 @@
       </p:sp>
       <p:sp>
         <p:nvSpPr>
-          <p:cNvPr id="31" name="Rectangle 30">
-            <a:extLst>
-              <a:ext uri="{FF2B5EF4-FFF2-40B4-BE49-F238E27FC236}">
-                <a16:creationId xmlns:a16="http://schemas.microsoft.com/office/drawing/2014/main" id="{070BF843-2E62-4541-B9D9-70BD6B206A27}"/>
+          <p:cNvPr id="2" name="Rectangle 1">
+            <a:extLst>
+              <a:ext uri="{FF2B5EF4-FFF2-40B4-BE49-F238E27FC236}">
+                <a16:creationId xmlns:a16="http://schemas.microsoft.com/office/drawing/2014/main" id="{4ACE14BB-AF38-4923-A5C6-5A10617920BA}"/>
               </a:ext>
             </a:extLst>
           </p:cNvPr>
@@ -7855,190 +8055,2940 @@
         </p:nvSpPr>
         <p:spPr>
           <a:xfrm>
-            <a:off x="523990" y="4243264"/>
-            <a:ext cx="2212848" cy="1143122"/>
+            <a:off x="523990" y="959221"/>
+            <a:ext cx="2203576" cy="5100220"/>
+          </a:xfrm>
+          <a:prstGeom prst="rect">
+            <a:avLst/>
+          </a:prstGeom>
+          <a:noFill/>
+          <a:ln w="76200">
+            <a:solidFill>
+              <a:schemeClr val="accent6">
+                <a:lumMod val="40000"/>
+                <a:lumOff val="60000"/>
+              </a:schemeClr>
+            </a:solidFill>
+          </a:ln>
+        </p:spPr>
+        <p:style>
+          <a:lnRef idx="2">
+            <a:schemeClr val="accent1">
+              <a:shade val="50000"/>
+            </a:schemeClr>
+          </a:lnRef>
+          <a:fillRef idx="1">
+            <a:schemeClr val="accent1"/>
+          </a:fillRef>
+          <a:effectRef idx="0">
+            <a:schemeClr val="accent1"/>
+          </a:effectRef>
+          <a:fontRef idx="minor">
+            <a:schemeClr val="lt1"/>
+          </a:fontRef>
+        </p:style>
+        <p:txBody>
+          <a:bodyPr rtlCol="0" anchor="ctr"/>
+          <a:lstStyle/>
+          <a:p>
+            <a:pPr algn="ctr"/>
+            <a:endParaRPr lang="en-US"/>
+          </a:p>
+        </p:txBody>
+      </p:sp>
+      <p:sp>
+        <p:nvSpPr>
+          <p:cNvPr id="32" name="Rectangle 31">
+            <a:extLst>
+              <a:ext uri="{FF2B5EF4-FFF2-40B4-BE49-F238E27FC236}">
+                <a16:creationId xmlns:a16="http://schemas.microsoft.com/office/drawing/2014/main" id="{105A55F9-6C87-4A86-A2F9-D1E4B7F5B46C}"/>
+              </a:ext>
+            </a:extLst>
+          </p:cNvPr>
+          <p:cNvSpPr/>
+          <p:nvPr/>
+        </p:nvSpPr>
+        <p:spPr>
+          <a:xfrm>
+            <a:off x="9270491" y="959222"/>
+            <a:ext cx="2231390" cy="2551192"/>
+          </a:xfrm>
+          <a:prstGeom prst="rect">
+            <a:avLst/>
+          </a:prstGeom>
+          <a:noFill/>
+          <a:ln w="76200">
+            <a:solidFill>
+              <a:schemeClr val="accent4">
+                <a:lumMod val="40000"/>
+                <a:lumOff val="60000"/>
+              </a:schemeClr>
+            </a:solidFill>
+          </a:ln>
+        </p:spPr>
+        <p:style>
+          <a:lnRef idx="2">
+            <a:schemeClr val="accent1">
+              <a:shade val="50000"/>
+            </a:schemeClr>
+          </a:lnRef>
+          <a:fillRef idx="1">
+            <a:schemeClr val="accent1"/>
+          </a:fillRef>
+          <a:effectRef idx="0">
+            <a:schemeClr val="accent1"/>
+          </a:effectRef>
+          <a:fontRef idx="minor">
+            <a:schemeClr val="lt1"/>
+          </a:fontRef>
+        </p:style>
+        <p:txBody>
+          <a:bodyPr rtlCol="0" anchor="ctr"/>
+          <a:lstStyle/>
+          <a:p>
+            <a:pPr algn="ctr"/>
+            <a:endParaRPr lang="en-US"/>
+          </a:p>
+        </p:txBody>
+      </p:sp>
+      <p:sp>
+        <p:nvSpPr>
+          <p:cNvPr id="33" name="Rectangle 32">
+            <a:extLst>
+              <a:ext uri="{FF2B5EF4-FFF2-40B4-BE49-F238E27FC236}">
+                <a16:creationId xmlns:a16="http://schemas.microsoft.com/office/drawing/2014/main" id="{58AD9831-CEF0-46D2-9064-817DDD599251}"/>
+              </a:ext>
+            </a:extLst>
+          </p:cNvPr>
+          <p:cNvSpPr/>
+          <p:nvPr/>
+        </p:nvSpPr>
+        <p:spPr>
+          <a:xfrm>
+            <a:off x="6591548" y="2349247"/>
+            <a:ext cx="2231390" cy="1710749"/>
+          </a:xfrm>
+          <a:prstGeom prst="rect">
+            <a:avLst/>
+          </a:prstGeom>
+          <a:noFill/>
+          <a:ln w="76200">
+            <a:solidFill>
+              <a:schemeClr val="accent6">
+                <a:lumMod val="40000"/>
+                <a:lumOff val="60000"/>
+              </a:schemeClr>
+            </a:solidFill>
+          </a:ln>
+        </p:spPr>
+        <p:style>
+          <a:lnRef idx="2">
+            <a:schemeClr val="accent1">
+              <a:shade val="50000"/>
+            </a:schemeClr>
+          </a:lnRef>
+          <a:fillRef idx="1">
+            <a:schemeClr val="accent1"/>
+          </a:fillRef>
+          <a:effectRef idx="0">
+            <a:schemeClr val="accent1"/>
+          </a:effectRef>
+          <a:fontRef idx="minor">
+            <a:schemeClr val="lt1"/>
+          </a:fontRef>
+        </p:style>
+        <p:txBody>
+          <a:bodyPr rtlCol="0" anchor="ctr"/>
+          <a:lstStyle/>
+          <a:p>
+            <a:pPr algn="ctr"/>
+            <a:endParaRPr lang="en-US"/>
+          </a:p>
+        </p:txBody>
+      </p:sp>
+      <p:sp>
+        <p:nvSpPr>
+          <p:cNvPr id="34" name="Rectangle 33">
+            <a:extLst>
+              <a:ext uri="{FF2B5EF4-FFF2-40B4-BE49-F238E27FC236}">
+                <a16:creationId xmlns:a16="http://schemas.microsoft.com/office/drawing/2014/main" id="{E798798F-C4D8-412A-B17D-D59E12564739}"/>
+              </a:ext>
+            </a:extLst>
+          </p:cNvPr>
+          <p:cNvSpPr/>
+          <p:nvPr/>
+        </p:nvSpPr>
+        <p:spPr>
+          <a:xfrm>
+            <a:off x="3530888" y="1636282"/>
+            <a:ext cx="2231390" cy="450700"/>
+          </a:xfrm>
+          <a:prstGeom prst="rect">
+            <a:avLst/>
+          </a:prstGeom>
+          <a:noFill/>
+          <a:ln w="76200">
+            <a:solidFill>
+              <a:schemeClr val="accent6">
+                <a:lumMod val="40000"/>
+                <a:lumOff val="60000"/>
+              </a:schemeClr>
+            </a:solidFill>
+          </a:ln>
+        </p:spPr>
+        <p:style>
+          <a:lnRef idx="2">
+            <a:schemeClr val="accent1">
+              <a:shade val="50000"/>
+            </a:schemeClr>
+          </a:lnRef>
+          <a:fillRef idx="1">
+            <a:schemeClr val="accent1"/>
+          </a:fillRef>
+          <a:effectRef idx="0">
+            <a:schemeClr val="accent1"/>
+          </a:effectRef>
+          <a:fontRef idx="minor">
+            <a:schemeClr val="lt1"/>
+          </a:fontRef>
+        </p:style>
+        <p:txBody>
+          <a:bodyPr rtlCol="0" anchor="ctr"/>
+          <a:lstStyle/>
+          <a:p>
+            <a:pPr algn="ctr"/>
+            <a:endParaRPr lang="en-US" dirty="0"/>
+          </a:p>
+        </p:txBody>
+      </p:sp>
+      <p:sp>
+        <p:nvSpPr>
+          <p:cNvPr id="36" name="Rectangle 35">
+            <a:extLst>
+              <a:ext uri="{FF2B5EF4-FFF2-40B4-BE49-F238E27FC236}">
+                <a16:creationId xmlns:a16="http://schemas.microsoft.com/office/drawing/2014/main" id="{B40D5A77-1217-4C8F-8D0A-C9EA8AB613CC}"/>
+              </a:ext>
+            </a:extLst>
+          </p:cNvPr>
+          <p:cNvSpPr/>
+          <p:nvPr/>
+        </p:nvSpPr>
+        <p:spPr>
+          <a:xfrm>
+            <a:off x="3531984" y="2733826"/>
+            <a:ext cx="2231390" cy="473812"/>
+          </a:xfrm>
+          <a:prstGeom prst="rect">
+            <a:avLst/>
+          </a:prstGeom>
+          <a:noFill/>
+          <a:ln w="76200">
+            <a:solidFill>
+              <a:schemeClr val="accent4">
+                <a:lumMod val="40000"/>
+                <a:lumOff val="60000"/>
+              </a:schemeClr>
+            </a:solidFill>
+          </a:ln>
+        </p:spPr>
+        <p:style>
+          <a:lnRef idx="2">
+            <a:schemeClr val="accent1">
+              <a:shade val="50000"/>
+            </a:schemeClr>
+          </a:lnRef>
+          <a:fillRef idx="1">
+            <a:schemeClr val="accent1"/>
+          </a:fillRef>
+          <a:effectRef idx="0">
+            <a:schemeClr val="accent1"/>
+          </a:effectRef>
+          <a:fontRef idx="minor">
+            <a:schemeClr val="lt1"/>
+          </a:fontRef>
+        </p:style>
+        <p:txBody>
+          <a:bodyPr rtlCol="0" anchor="ctr"/>
+          <a:lstStyle/>
+          <a:p>
+            <a:pPr algn="ctr"/>
+            <a:endParaRPr lang="en-US"/>
+          </a:p>
+        </p:txBody>
+      </p:sp>
+      <p:sp>
+        <p:nvSpPr>
+          <p:cNvPr id="37" name="Rectangle 36">
+            <a:extLst>
+              <a:ext uri="{FF2B5EF4-FFF2-40B4-BE49-F238E27FC236}">
+                <a16:creationId xmlns:a16="http://schemas.microsoft.com/office/drawing/2014/main" id="{A4571168-F5EB-42A6-84FD-CA381A86C04D}"/>
+              </a:ext>
+            </a:extLst>
+          </p:cNvPr>
+          <p:cNvSpPr/>
+          <p:nvPr/>
+        </p:nvSpPr>
+        <p:spPr>
+          <a:xfrm>
+            <a:off x="3219737" y="959220"/>
+            <a:ext cx="2835021" cy="4302771"/>
+          </a:xfrm>
+          <a:prstGeom prst="rect">
+            <a:avLst/>
+          </a:prstGeom>
+          <a:noFill/>
+          <a:ln w="76200">
+            <a:solidFill>
+              <a:srgbClr val="F24848"/>
+            </a:solidFill>
+          </a:ln>
+        </p:spPr>
+        <p:style>
+          <a:lnRef idx="2">
+            <a:schemeClr val="accent1">
+              <a:shade val="50000"/>
+            </a:schemeClr>
+          </a:lnRef>
+          <a:fillRef idx="1">
+            <a:schemeClr val="accent1"/>
+          </a:fillRef>
+          <a:effectRef idx="0">
+            <a:schemeClr val="accent1"/>
+          </a:effectRef>
+          <a:fontRef idx="minor">
+            <a:schemeClr val="lt1"/>
+          </a:fontRef>
+        </p:style>
+        <p:txBody>
+          <a:bodyPr rtlCol="0" anchor="ctr"/>
+          <a:lstStyle/>
+          <a:p>
+            <a:pPr algn="ctr"/>
+            <a:endParaRPr lang="en-US"/>
+          </a:p>
+        </p:txBody>
+      </p:sp>
+      <p:sp>
+        <p:nvSpPr>
+          <p:cNvPr id="39" name="Rectangle 38">
+            <a:extLst>
+              <a:ext uri="{FF2B5EF4-FFF2-40B4-BE49-F238E27FC236}">
+                <a16:creationId xmlns:a16="http://schemas.microsoft.com/office/drawing/2014/main" id="{DDC98124-A10C-4CC8-A3FB-7EE7FAB90C0A}"/>
+              </a:ext>
+            </a:extLst>
+          </p:cNvPr>
+          <p:cNvSpPr/>
+          <p:nvPr/>
+        </p:nvSpPr>
+        <p:spPr>
+          <a:xfrm>
+            <a:off x="3548951" y="2195702"/>
+            <a:ext cx="2222119" cy="448056"/>
+          </a:xfrm>
+          <a:prstGeom prst="rect">
+            <a:avLst/>
+          </a:prstGeom>
+          <a:noFill/>
+          <a:ln w="76200">
+            <a:solidFill>
+              <a:schemeClr val="accent6">
+                <a:lumMod val="40000"/>
+                <a:lumOff val="60000"/>
+              </a:schemeClr>
+            </a:solidFill>
+          </a:ln>
+        </p:spPr>
+        <p:style>
+          <a:lnRef idx="2">
+            <a:schemeClr val="accent1">
+              <a:shade val="50000"/>
+            </a:schemeClr>
+          </a:lnRef>
+          <a:fillRef idx="1">
+            <a:schemeClr val="accent1"/>
+          </a:fillRef>
+          <a:effectRef idx="0">
+            <a:schemeClr val="accent1"/>
+          </a:effectRef>
+          <a:fontRef idx="minor">
+            <a:schemeClr val="lt1"/>
+          </a:fontRef>
+        </p:style>
+        <p:txBody>
+          <a:bodyPr rtlCol="0" anchor="ctr"/>
+          <a:lstStyle/>
+          <a:p>
+            <a:pPr algn="ctr"/>
+            <a:endParaRPr lang="en-US"/>
+          </a:p>
+        </p:txBody>
+      </p:sp>
+      <p:sp>
+        <p:nvSpPr>
+          <p:cNvPr id="40" name="Rectangle 39">
+            <a:extLst>
+              <a:ext uri="{FF2B5EF4-FFF2-40B4-BE49-F238E27FC236}">
+                <a16:creationId xmlns:a16="http://schemas.microsoft.com/office/drawing/2014/main" id="{9D12B7C9-1D00-4F40-8701-6BDE4CF6FD5F}"/>
+              </a:ext>
+            </a:extLst>
+          </p:cNvPr>
+          <p:cNvSpPr/>
+          <p:nvPr/>
+        </p:nvSpPr>
+        <p:spPr>
+          <a:xfrm>
+            <a:off x="3545927" y="3323462"/>
+            <a:ext cx="2222119" cy="448056"/>
+          </a:xfrm>
+          <a:prstGeom prst="rect">
+            <a:avLst/>
+          </a:prstGeom>
+          <a:noFill/>
+          <a:ln w="76200">
+            <a:solidFill>
+              <a:srgbClr val="F24848"/>
+            </a:solidFill>
+          </a:ln>
+        </p:spPr>
+        <p:style>
+          <a:lnRef idx="2">
+            <a:schemeClr val="accent1">
+              <a:shade val="50000"/>
+            </a:schemeClr>
+          </a:lnRef>
+          <a:fillRef idx="1">
+            <a:schemeClr val="accent1"/>
+          </a:fillRef>
+          <a:effectRef idx="0">
+            <a:schemeClr val="accent1"/>
+          </a:effectRef>
+          <a:fontRef idx="minor">
+            <a:schemeClr val="lt1"/>
+          </a:fontRef>
+        </p:style>
+        <p:txBody>
+          <a:bodyPr rtlCol="0" anchor="ctr"/>
+          <a:lstStyle/>
+          <a:p>
+            <a:pPr algn="ctr"/>
+            <a:endParaRPr lang="en-US"/>
+          </a:p>
+        </p:txBody>
+      </p:sp>
+      <p:sp>
+        <p:nvSpPr>
+          <p:cNvPr id="41" name="Rectangle 40">
+            <a:extLst>
+              <a:ext uri="{FF2B5EF4-FFF2-40B4-BE49-F238E27FC236}">
+                <a16:creationId xmlns:a16="http://schemas.microsoft.com/office/drawing/2014/main" id="{581F53DD-04E4-4452-A2C2-D0F96D189F66}"/>
+              </a:ext>
+            </a:extLst>
+          </p:cNvPr>
+          <p:cNvSpPr/>
+          <p:nvPr/>
+        </p:nvSpPr>
+        <p:spPr>
+          <a:xfrm>
+            <a:off x="6591548" y="4331555"/>
+            <a:ext cx="2222119" cy="2381415"/>
+          </a:xfrm>
+          <a:prstGeom prst="rect">
+            <a:avLst/>
+          </a:prstGeom>
+          <a:noFill/>
+          <a:ln w="76200">
+            <a:solidFill>
+              <a:schemeClr val="accent6">
+                <a:lumMod val="40000"/>
+                <a:lumOff val="60000"/>
+              </a:schemeClr>
+            </a:solidFill>
+          </a:ln>
+        </p:spPr>
+        <p:style>
+          <a:lnRef idx="2">
+            <a:schemeClr val="accent1">
+              <a:shade val="50000"/>
+            </a:schemeClr>
+          </a:lnRef>
+          <a:fillRef idx="1">
+            <a:schemeClr val="accent1"/>
+          </a:fillRef>
+          <a:effectRef idx="0">
+            <a:schemeClr val="accent1"/>
+          </a:effectRef>
+          <a:fontRef idx="minor">
+            <a:schemeClr val="lt1"/>
+          </a:fontRef>
+        </p:style>
+        <p:txBody>
+          <a:bodyPr rtlCol="0" anchor="ctr"/>
+          <a:lstStyle/>
+          <a:p>
+            <a:pPr algn="ctr"/>
+            <a:endParaRPr lang="en-US"/>
+          </a:p>
+        </p:txBody>
+      </p:sp>
+      <p:sp>
+        <p:nvSpPr>
+          <p:cNvPr id="42" name="Rectangle 41">
+            <a:extLst>
+              <a:ext uri="{FF2B5EF4-FFF2-40B4-BE49-F238E27FC236}">
+                <a16:creationId xmlns:a16="http://schemas.microsoft.com/office/drawing/2014/main" id="{5BAE0D11-8D60-4034-A483-053CEC3696BC}"/>
+              </a:ext>
+            </a:extLst>
+          </p:cNvPr>
+          <p:cNvSpPr/>
+          <p:nvPr/>
+        </p:nvSpPr>
+        <p:spPr>
+          <a:xfrm>
+            <a:off x="6591548" y="965699"/>
+            <a:ext cx="2222119" cy="1112213"/>
+          </a:xfrm>
+          <a:prstGeom prst="rect">
+            <a:avLst/>
+          </a:prstGeom>
+          <a:noFill/>
+          <a:ln w="76200">
+            <a:solidFill>
+              <a:srgbClr val="F24848"/>
+            </a:solidFill>
+          </a:ln>
+        </p:spPr>
+        <p:style>
+          <a:lnRef idx="2">
+            <a:schemeClr val="accent1">
+              <a:shade val="50000"/>
+            </a:schemeClr>
+          </a:lnRef>
+          <a:fillRef idx="1">
+            <a:schemeClr val="accent1"/>
+          </a:fillRef>
+          <a:effectRef idx="0">
+            <a:schemeClr val="accent1"/>
+          </a:effectRef>
+          <a:fontRef idx="minor">
+            <a:schemeClr val="lt1"/>
+          </a:fontRef>
+        </p:style>
+        <p:txBody>
+          <a:bodyPr rtlCol="0" anchor="ctr"/>
+          <a:lstStyle/>
+          <a:p>
+            <a:pPr algn="ctr"/>
+            <a:endParaRPr lang="en-US"/>
+          </a:p>
+        </p:txBody>
+      </p:sp>
+      <p:sp>
+        <p:nvSpPr>
+          <p:cNvPr id="43" name="Rectangle 42">
+            <a:extLst>
+              <a:ext uri="{FF2B5EF4-FFF2-40B4-BE49-F238E27FC236}">
+                <a16:creationId xmlns:a16="http://schemas.microsoft.com/office/drawing/2014/main" id="{6D649630-1324-4848-A53E-C33BE48B2E92}"/>
+              </a:ext>
+            </a:extLst>
+          </p:cNvPr>
+          <p:cNvSpPr/>
+          <p:nvPr/>
+        </p:nvSpPr>
+        <p:spPr>
+          <a:xfrm>
+            <a:off x="396194" y="113401"/>
+            <a:ext cx="7464129" cy="662815"/>
+          </a:xfrm>
+          <a:prstGeom prst="rect">
+            <a:avLst/>
+          </a:prstGeom>
+          <a:noFill/>
+          <a:ln w="76200">
+            <a:solidFill>
+              <a:srgbClr val="F24848"/>
+            </a:solidFill>
+          </a:ln>
+        </p:spPr>
+        <p:style>
+          <a:lnRef idx="2">
+            <a:schemeClr val="accent1">
+              <a:shade val="50000"/>
+            </a:schemeClr>
+          </a:lnRef>
+          <a:fillRef idx="1">
+            <a:schemeClr val="accent1"/>
+          </a:fillRef>
+          <a:effectRef idx="0">
+            <a:schemeClr val="accent1"/>
+          </a:effectRef>
+          <a:fontRef idx="minor">
+            <a:schemeClr val="lt1"/>
+          </a:fontRef>
+        </p:style>
+        <p:txBody>
+          <a:bodyPr rtlCol="0" anchor="ctr"/>
+          <a:lstStyle/>
+          <a:p>
+            <a:pPr algn="ctr"/>
+            <a:endParaRPr lang="en-US"/>
+          </a:p>
+        </p:txBody>
+      </p:sp>
+      <p:sp>
+        <p:nvSpPr>
+          <p:cNvPr id="44" name="Rectangle 43">
+            <a:extLst>
+              <a:ext uri="{FF2B5EF4-FFF2-40B4-BE49-F238E27FC236}">
+                <a16:creationId xmlns:a16="http://schemas.microsoft.com/office/drawing/2014/main" id="{AA30EA56-7D33-41FD-BABA-91C24F0BE361}"/>
+              </a:ext>
+            </a:extLst>
+          </p:cNvPr>
+          <p:cNvSpPr/>
+          <p:nvPr/>
+        </p:nvSpPr>
+        <p:spPr>
+          <a:xfrm>
+            <a:off x="9270491" y="3715784"/>
+            <a:ext cx="2222119" cy="2992727"/>
+          </a:xfrm>
+          <a:prstGeom prst="rect">
+            <a:avLst/>
+          </a:prstGeom>
+          <a:noFill/>
+          <a:ln w="76200">
+            <a:solidFill>
+              <a:srgbClr val="F24848"/>
+            </a:solidFill>
+          </a:ln>
+        </p:spPr>
+        <p:style>
+          <a:lnRef idx="2">
+            <a:schemeClr val="accent1">
+              <a:shade val="50000"/>
+            </a:schemeClr>
+          </a:lnRef>
+          <a:fillRef idx="1">
+            <a:schemeClr val="accent1"/>
+          </a:fillRef>
+          <a:effectRef idx="0">
+            <a:schemeClr val="accent1"/>
+          </a:effectRef>
+          <a:fontRef idx="minor">
+            <a:schemeClr val="lt1"/>
+          </a:fontRef>
+        </p:style>
+        <p:txBody>
+          <a:bodyPr rtlCol="0" anchor="ctr"/>
+          <a:lstStyle/>
+          <a:p>
+            <a:pPr algn="ctr"/>
+            <a:endParaRPr lang="en-US"/>
+          </a:p>
+        </p:txBody>
+      </p:sp>
+    </p:spTree>
+    <p:extLst>
+      <p:ext uri="{BB962C8B-B14F-4D97-AF65-F5344CB8AC3E}">
+        <p14:creationId xmlns:p14="http://schemas.microsoft.com/office/powerpoint/2010/main" val="1297506879"/>
+      </p:ext>
+    </p:extLst>
+  </p:cSld>
+  <p:clrMapOvr>
+    <a:masterClrMapping/>
+  </p:clrMapOvr>
+</p:sld>
+</file>
+
+<file path=ppt/slides/slide2.xml><?xml version="1.0" encoding="utf-8"?>
+<p:sld xmlns:a="http://schemas.openxmlformats.org/drawingml/2006/main" xmlns:r="http://schemas.openxmlformats.org/officeDocument/2006/relationships" xmlns:p="http://schemas.openxmlformats.org/presentationml/2006/main">
+  <p:cSld>
+    <p:spTree>
+      <p:nvGrpSpPr>
+        <p:cNvPr id="1" name=""/>
+        <p:cNvGrpSpPr/>
+        <p:nvPr/>
+      </p:nvGrpSpPr>
+      <p:grpSpPr>
+        <a:xfrm>
+          <a:off x="0" y="0"/>
+          <a:ext cx="0" cy="0"/>
+          <a:chOff x="0" y="0"/>
+          <a:chExt cx="0" cy="0"/>
+        </a:xfrm>
+      </p:grpSpPr>
+      <p:cxnSp>
+        <p:nvCxnSpPr>
+          <p:cNvPr id="8" name="Straight Connector 7">
+            <a:extLst>
+              <a:ext uri="{FF2B5EF4-FFF2-40B4-BE49-F238E27FC236}">
+                <a16:creationId xmlns:a16="http://schemas.microsoft.com/office/drawing/2014/main" id="{77DBBDF3-FBCE-4557-B50C-2FACDAAAB766}"/>
+              </a:ext>
+            </a:extLst>
+          </p:cNvPr>
+          <p:cNvCxnSpPr>
+            <a:cxnSpLocks/>
+          </p:cNvCxnSpPr>
+          <p:nvPr/>
+        </p:nvCxnSpPr>
+        <p:spPr>
+          <a:xfrm>
+            <a:off x="2145324" y="1648586"/>
+            <a:ext cx="6915346" cy="0"/>
+          </a:xfrm>
+          <a:prstGeom prst="line">
+            <a:avLst/>
+          </a:prstGeom>
+          <a:ln w="57150">
+            <a:solidFill>
+              <a:schemeClr val="tx1"/>
+            </a:solidFill>
+          </a:ln>
+        </p:spPr>
+        <p:style>
+          <a:lnRef idx="1">
+            <a:schemeClr val="accent1"/>
+          </a:lnRef>
+          <a:fillRef idx="0">
+            <a:schemeClr val="accent1"/>
+          </a:fillRef>
+          <a:effectRef idx="0">
+            <a:schemeClr val="accent1"/>
+          </a:effectRef>
+          <a:fontRef idx="minor">
+            <a:schemeClr val="tx1"/>
+          </a:fontRef>
+        </p:style>
+      </p:cxnSp>
+      <p:sp>
+        <p:nvSpPr>
+          <p:cNvPr id="6" name="Rectangle 5">
+            <a:extLst>
+              <a:ext uri="{FF2B5EF4-FFF2-40B4-BE49-F238E27FC236}">
+                <a16:creationId xmlns:a16="http://schemas.microsoft.com/office/drawing/2014/main" id="{C88794C9-51F5-4444-B172-3C8EA7256E37}"/>
+              </a:ext>
+            </a:extLst>
+          </p:cNvPr>
+          <p:cNvSpPr/>
+          <p:nvPr/>
+        </p:nvSpPr>
+        <p:spPr>
+          <a:xfrm>
+            <a:off x="2804747" y="1195782"/>
+            <a:ext cx="386861" cy="905608"/>
           </a:xfrm>
           <a:prstGeom prst="rect">
             <a:avLst/>
           </a:prstGeom>
           <a:solidFill>
-            <a:schemeClr val="bg1"/>
+            <a:srgbClr val="09FF38">
+              <a:alpha val="60000"/>
+            </a:srgbClr>
           </a:solidFill>
+          <a:ln>
+            <a:solidFill>
+              <a:schemeClr val="tx1"/>
+            </a:solidFill>
+          </a:ln>
         </p:spPr>
         <p:style>
           <a:lnRef idx="2">
-            <a:schemeClr val="accent2">
+            <a:schemeClr val="accent1">
               <a:shade val="50000"/>
             </a:schemeClr>
           </a:lnRef>
           <a:fillRef idx="1">
-            <a:schemeClr val="accent2"/>
+            <a:schemeClr val="accent1"/>
           </a:fillRef>
           <a:effectRef idx="0">
-            <a:schemeClr val="accent2"/>
+            <a:schemeClr val="accent1"/>
           </a:effectRef>
           <a:fontRef idx="minor">
             <a:schemeClr val="lt1"/>
           </a:fontRef>
         </p:style>
         <p:txBody>
-          <a:bodyPr rot="0" spcFirstLastPara="0" vert="horz" wrap="square" lIns="91440" tIns="45720" rIns="91440" bIns="45720" numCol="1" spcCol="0" rtlCol="0" fromWordArt="0" anchor="ctr" anchorCtr="0" forceAA="0" compatLnSpc="1">
-            <a:prstTxWarp prst="textNoShape">
-              <a:avLst/>
-            </a:prstTxWarp>
-            <a:noAutofit/>
+          <a:bodyPr rtlCol="0" anchor="ctr"/>
+          <a:lstStyle/>
+          <a:p>
+            <a:pPr algn="ctr"/>
+            <a:endParaRPr lang="en-US" dirty="0"/>
+          </a:p>
+        </p:txBody>
+      </p:sp>
+      <p:sp>
+        <p:nvSpPr>
+          <p:cNvPr id="9" name="Rectangle 8">
+            <a:extLst>
+              <a:ext uri="{FF2B5EF4-FFF2-40B4-BE49-F238E27FC236}">
+                <a16:creationId xmlns:a16="http://schemas.microsoft.com/office/drawing/2014/main" id="{090BE4BF-CE7B-4373-8FE8-E5B7D5EEB922}"/>
+              </a:ext>
+            </a:extLst>
+          </p:cNvPr>
+          <p:cNvSpPr/>
+          <p:nvPr/>
+        </p:nvSpPr>
+        <p:spPr>
+          <a:xfrm>
+            <a:off x="3191608" y="1195782"/>
+            <a:ext cx="386861" cy="905608"/>
+          </a:xfrm>
+          <a:prstGeom prst="rect">
+            <a:avLst/>
+          </a:prstGeom>
+          <a:solidFill>
+            <a:srgbClr val="09FF38">
+              <a:alpha val="60000"/>
+            </a:srgbClr>
+          </a:solidFill>
+          <a:ln>
+            <a:solidFill>
+              <a:schemeClr val="tx1"/>
+            </a:solidFill>
+          </a:ln>
+        </p:spPr>
+        <p:style>
+          <a:lnRef idx="2">
+            <a:schemeClr val="accent1">
+              <a:shade val="50000"/>
+            </a:schemeClr>
+          </a:lnRef>
+          <a:fillRef idx="1">
+            <a:schemeClr val="accent1"/>
+          </a:fillRef>
+          <a:effectRef idx="0">
+            <a:schemeClr val="accent1"/>
+          </a:effectRef>
+          <a:fontRef idx="minor">
+            <a:schemeClr val="lt1"/>
+          </a:fontRef>
+        </p:style>
+        <p:txBody>
+          <a:bodyPr rtlCol="0" anchor="ctr"/>
+          <a:lstStyle/>
+          <a:p>
+            <a:pPr algn="ctr"/>
+            <a:endParaRPr lang="en-US"/>
+          </a:p>
+        </p:txBody>
+      </p:sp>
+      <p:sp>
+        <p:nvSpPr>
+          <p:cNvPr id="10" name="Rectangle 9">
+            <a:extLst>
+              <a:ext uri="{FF2B5EF4-FFF2-40B4-BE49-F238E27FC236}">
+                <a16:creationId xmlns:a16="http://schemas.microsoft.com/office/drawing/2014/main" id="{C5F6A103-4874-4319-846D-7F03AEDC59C4}"/>
+              </a:ext>
+            </a:extLst>
+          </p:cNvPr>
+          <p:cNvSpPr/>
+          <p:nvPr/>
+        </p:nvSpPr>
+        <p:spPr>
+          <a:xfrm>
+            <a:off x="3578469" y="1195782"/>
+            <a:ext cx="386861" cy="905608"/>
+          </a:xfrm>
+          <a:prstGeom prst="rect">
+            <a:avLst/>
+          </a:prstGeom>
+          <a:solidFill>
+            <a:srgbClr val="09FF38">
+              <a:alpha val="60000"/>
+            </a:srgbClr>
+          </a:solidFill>
+          <a:ln>
+            <a:solidFill>
+              <a:schemeClr val="tx1"/>
+            </a:solidFill>
+          </a:ln>
+        </p:spPr>
+        <p:style>
+          <a:lnRef idx="2">
+            <a:schemeClr val="accent1">
+              <a:shade val="50000"/>
+            </a:schemeClr>
+          </a:lnRef>
+          <a:fillRef idx="1">
+            <a:schemeClr val="accent1"/>
+          </a:fillRef>
+          <a:effectRef idx="0">
+            <a:schemeClr val="accent1"/>
+          </a:effectRef>
+          <a:fontRef idx="minor">
+            <a:schemeClr val="lt1"/>
+          </a:fontRef>
+        </p:style>
+        <p:txBody>
+          <a:bodyPr rtlCol="0" anchor="ctr"/>
+          <a:lstStyle/>
+          <a:p>
+            <a:pPr algn="ctr"/>
+            <a:endParaRPr lang="en-US"/>
+          </a:p>
+        </p:txBody>
+      </p:sp>
+      <p:sp>
+        <p:nvSpPr>
+          <p:cNvPr id="11" name="Rectangle 10">
+            <a:extLst>
+              <a:ext uri="{FF2B5EF4-FFF2-40B4-BE49-F238E27FC236}">
+                <a16:creationId xmlns:a16="http://schemas.microsoft.com/office/drawing/2014/main" id="{67D3D5FB-29F6-40A2-8DEC-18F1C5657A47}"/>
+              </a:ext>
+            </a:extLst>
+          </p:cNvPr>
+          <p:cNvSpPr/>
+          <p:nvPr/>
+        </p:nvSpPr>
+        <p:spPr>
+          <a:xfrm>
+            <a:off x="3965330" y="1195782"/>
+            <a:ext cx="386861" cy="905608"/>
+          </a:xfrm>
+          <a:prstGeom prst="rect">
+            <a:avLst/>
+          </a:prstGeom>
+          <a:solidFill>
+            <a:srgbClr val="09FF38">
+              <a:alpha val="60000"/>
+            </a:srgbClr>
+          </a:solidFill>
+          <a:ln>
+            <a:solidFill>
+              <a:schemeClr val="tx1"/>
+            </a:solidFill>
+          </a:ln>
+        </p:spPr>
+        <p:style>
+          <a:lnRef idx="2">
+            <a:schemeClr val="accent1">
+              <a:shade val="50000"/>
+            </a:schemeClr>
+          </a:lnRef>
+          <a:fillRef idx="1">
+            <a:schemeClr val="accent1"/>
+          </a:fillRef>
+          <a:effectRef idx="0">
+            <a:schemeClr val="accent1"/>
+          </a:effectRef>
+          <a:fontRef idx="minor">
+            <a:schemeClr val="lt1"/>
+          </a:fontRef>
+        </p:style>
+        <p:txBody>
+          <a:bodyPr rtlCol="0" anchor="ctr"/>
+          <a:lstStyle/>
+          <a:p>
+            <a:pPr algn="ctr"/>
+            <a:endParaRPr lang="en-US"/>
+          </a:p>
+        </p:txBody>
+      </p:sp>
+      <p:sp>
+        <p:nvSpPr>
+          <p:cNvPr id="12" name="Rectangle 11">
+            <a:extLst>
+              <a:ext uri="{FF2B5EF4-FFF2-40B4-BE49-F238E27FC236}">
+                <a16:creationId xmlns:a16="http://schemas.microsoft.com/office/drawing/2014/main" id="{03645693-1A68-4D0F-A3F8-286024F08828}"/>
+              </a:ext>
+            </a:extLst>
+          </p:cNvPr>
+          <p:cNvSpPr/>
+          <p:nvPr/>
+        </p:nvSpPr>
+        <p:spPr>
+          <a:xfrm>
+            <a:off x="4352191" y="1195782"/>
+            <a:ext cx="386861" cy="905608"/>
+          </a:xfrm>
+          <a:prstGeom prst="rect">
+            <a:avLst/>
+          </a:prstGeom>
+          <a:solidFill>
+            <a:srgbClr val="09FF38">
+              <a:alpha val="60000"/>
+            </a:srgbClr>
+          </a:solidFill>
+          <a:ln>
+            <a:solidFill>
+              <a:schemeClr val="tx1"/>
+            </a:solidFill>
+          </a:ln>
+        </p:spPr>
+        <p:style>
+          <a:lnRef idx="2">
+            <a:schemeClr val="accent1">
+              <a:shade val="50000"/>
+            </a:schemeClr>
+          </a:lnRef>
+          <a:fillRef idx="1">
+            <a:schemeClr val="accent1"/>
+          </a:fillRef>
+          <a:effectRef idx="0">
+            <a:schemeClr val="accent1"/>
+          </a:effectRef>
+          <a:fontRef idx="minor">
+            <a:schemeClr val="lt1"/>
+          </a:fontRef>
+        </p:style>
+        <p:txBody>
+          <a:bodyPr rtlCol="0" anchor="ctr"/>
+          <a:lstStyle/>
+          <a:p>
+            <a:pPr algn="ctr"/>
+            <a:endParaRPr lang="en-US"/>
+          </a:p>
+        </p:txBody>
+      </p:sp>
+      <p:sp>
+        <p:nvSpPr>
+          <p:cNvPr id="13" name="Rectangle 12">
+            <a:extLst>
+              <a:ext uri="{FF2B5EF4-FFF2-40B4-BE49-F238E27FC236}">
+                <a16:creationId xmlns:a16="http://schemas.microsoft.com/office/drawing/2014/main" id="{575CAA81-4564-4D2B-96AE-5C369CC74AB5}"/>
+              </a:ext>
+            </a:extLst>
+          </p:cNvPr>
+          <p:cNvSpPr/>
+          <p:nvPr/>
+        </p:nvSpPr>
+        <p:spPr>
+          <a:xfrm>
+            <a:off x="4739052" y="1195782"/>
+            <a:ext cx="386861" cy="905608"/>
+          </a:xfrm>
+          <a:prstGeom prst="rect">
+            <a:avLst/>
+          </a:prstGeom>
+          <a:solidFill>
+            <a:srgbClr val="09FF38">
+              <a:alpha val="60000"/>
+            </a:srgbClr>
+          </a:solidFill>
+          <a:ln>
+            <a:solidFill>
+              <a:schemeClr val="tx1"/>
+            </a:solidFill>
+          </a:ln>
+        </p:spPr>
+        <p:style>
+          <a:lnRef idx="2">
+            <a:schemeClr val="accent1">
+              <a:shade val="50000"/>
+            </a:schemeClr>
+          </a:lnRef>
+          <a:fillRef idx="1">
+            <a:schemeClr val="accent1"/>
+          </a:fillRef>
+          <a:effectRef idx="0">
+            <a:schemeClr val="accent1"/>
+          </a:effectRef>
+          <a:fontRef idx="minor">
+            <a:schemeClr val="lt1"/>
+          </a:fontRef>
+        </p:style>
+        <p:txBody>
+          <a:bodyPr rtlCol="0" anchor="ctr"/>
+          <a:lstStyle/>
+          <a:p>
+            <a:pPr algn="ctr"/>
+            <a:endParaRPr lang="en-US"/>
+          </a:p>
+        </p:txBody>
+      </p:sp>
+      <p:sp>
+        <p:nvSpPr>
+          <p:cNvPr id="14" name="Rectangle 13">
+            <a:extLst>
+              <a:ext uri="{FF2B5EF4-FFF2-40B4-BE49-F238E27FC236}">
+                <a16:creationId xmlns:a16="http://schemas.microsoft.com/office/drawing/2014/main" id="{7DA711DC-CDE9-4F6A-8370-45633A7C8C25}"/>
+              </a:ext>
+            </a:extLst>
+          </p:cNvPr>
+          <p:cNvSpPr/>
+          <p:nvPr/>
+        </p:nvSpPr>
+        <p:spPr>
+          <a:xfrm>
+            <a:off x="5125913" y="1195782"/>
+            <a:ext cx="386861" cy="905608"/>
+          </a:xfrm>
+          <a:prstGeom prst="rect">
+            <a:avLst/>
+          </a:prstGeom>
+          <a:solidFill>
+            <a:srgbClr val="09FF38">
+              <a:alpha val="60000"/>
+            </a:srgbClr>
+          </a:solidFill>
+          <a:ln>
+            <a:solidFill>
+              <a:schemeClr val="tx1"/>
+            </a:solidFill>
+          </a:ln>
+        </p:spPr>
+        <p:style>
+          <a:lnRef idx="2">
+            <a:schemeClr val="accent1">
+              <a:shade val="50000"/>
+            </a:schemeClr>
+          </a:lnRef>
+          <a:fillRef idx="1">
+            <a:schemeClr val="accent1"/>
+          </a:fillRef>
+          <a:effectRef idx="0">
+            <a:schemeClr val="accent1"/>
+          </a:effectRef>
+          <a:fontRef idx="minor">
+            <a:schemeClr val="lt1"/>
+          </a:fontRef>
+        </p:style>
+        <p:txBody>
+          <a:bodyPr rtlCol="0" anchor="ctr"/>
+          <a:lstStyle/>
+          <a:p>
+            <a:pPr algn="ctr"/>
+            <a:endParaRPr lang="en-US"/>
+          </a:p>
+        </p:txBody>
+      </p:sp>
+      <p:sp>
+        <p:nvSpPr>
+          <p:cNvPr id="15" name="Rectangle 14">
+            <a:extLst>
+              <a:ext uri="{FF2B5EF4-FFF2-40B4-BE49-F238E27FC236}">
+                <a16:creationId xmlns:a16="http://schemas.microsoft.com/office/drawing/2014/main" id="{4A07E9AC-AAEF-4C35-9BAE-A28ED779AC7D}"/>
+              </a:ext>
+            </a:extLst>
+          </p:cNvPr>
+          <p:cNvSpPr/>
+          <p:nvPr/>
+        </p:nvSpPr>
+        <p:spPr>
+          <a:xfrm>
+            <a:off x="5512774" y="1195782"/>
+            <a:ext cx="386861" cy="905608"/>
+          </a:xfrm>
+          <a:prstGeom prst="rect">
+            <a:avLst/>
+          </a:prstGeom>
+          <a:solidFill>
+            <a:srgbClr val="09FF38">
+              <a:alpha val="60000"/>
+            </a:srgbClr>
+          </a:solidFill>
+          <a:ln>
+            <a:solidFill>
+              <a:schemeClr val="tx1"/>
+            </a:solidFill>
+          </a:ln>
+        </p:spPr>
+        <p:style>
+          <a:lnRef idx="2">
+            <a:schemeClr val="accent1">
+              <a:shade val="50000"/>
+            </a:schemeClr>
+          </a:lnRef>
+          <a:fillRef idx="1">
+            <a:schemeClr val="accent1"/>
+          </a:fillRef>
+          <a:effectRef idx="0">
+            <a:schemeClr val="accent1"/>
+          </a:effectRef>
+          <a:fontRef idx="minor">
+            <a:schemeClr val="lt1"/>
+          </a:fontRef>
+        </p:style>
+        <p:txBody>
+          <a:bodyPr rtlCol="0" anchor="ctr"/>
+          <a:lstStyle/>
+          <a:p>
+            <a:pPr algn="ctr"/>
+            <a:endParaRPr lang="en-US"/>
+          </a:p>
+        </p:txBody>
+      </p:sp>
+      <p:sp>
+        <p:nvSpPr>
+          <p:cNvPr id="16" name="Rectangle 15">
+            <a:extLst>
+              <a:ext uri="{FF2B5EF4-FFF2-40B4-BE49-F238E27FC236}">
+                <a16:creationId xmlns:a16="http://schemas.microsoft.com/office/drawing/2014/main" id="{C45B2534-92D3-412B-94A3-FCB915C79EC6}"/>
+              </a:ext>
+            </a:extLst>
+          </p:cNvPr>
+          <p:cNvSpPr/>
+          <p:nvPr/>
+        </p:nvSpPr>
+        <p:spPr>
+          <a:xfrm>
+            <a:off x="5899635" y="1195782"/>
+            <a:ext cx="386861" cy="905608"/>
+          </a:xfrm>
+          <a:prstGeom prst="rect">
+            <a:avLst/>
+          </a:prstGeom>
+          <a:solidFill>
+            <a:srgbClr val="09FF38">
+              <a:alpha val="60000"/>
+            </a:srgbClr>
+          </a:solidFill>
+          <a:ln>
+            <a:solidFill>
+              <a:schemeClr val="tx1"/>
+            </a:solidFill>
+          </a:ln>
+        </p:spPr>
+        <p:style>
+          <a:lnRef idx="2">
+            <a:schemeClr val="accent1">
+              <a:shade val="50000"/>
+            </a:schemeClr>
+          </a:lnRef>
+          <a:fillRef idx="1">
+            <a:schemeClr val="accent1"/>
+          </a:fillRef>
+          <a:effectRef idx="0">
+            <a:schemeClr val="accent1"/>
+          </a:effectRef>
+          <a:fontRef idx="minor">
+            <a:schemeClr val="lt1"/>
+          </a:fontRef>
+        </p:style>
+        <p:txBody>
+          <a:bodyPr rtlCol="0" anchor="ctr"/>
+          <a:lstStyle/>
+          <a:p>
+            <a:pPr algn="ctr"/>
+            <a:endParaRPr lang="en-US"/>
+          </a:p>
+        </p:txBody>
+      </p:sp>
+      <p:sp>
+        <p:nvSpPr>
+          <p:cNvPr id="17" name="Rectangle 16">
+            <a:extLst>
+              <a:ext uri="{FF2B5EF4-FFF2-40B4-BE49-F238E27FC236}">
+                <a16:creationId xmlns:a16="http://schemas.microsoft.com/office/drawing/2014/main" id="{8757068B-68F4-4FC5-A3A4-0F11C12CB336}"/>
+              </a:ext>
+            </a:extLst>
+          </p:cNvPr>
+          <p:cNvSpPr/>
+          <p:nvPr/>
+        </p:nvSpPr>
+        <p:spPr>
+          <a:xfrm>
+            <a:off x="6286496" y="1195782"/>
+            <a:ext cx="386861" cy="905608"/>
+          </a:xfrm>
+          <a:prstGeom prst="rect">
+            <a:avLst/>
+          </a:prstGeom>
+          <a:solidFill>
+            <a:srgbClr val="09FF38">
+              <a:alpha val="60000"/>
+            </a:srgbClr>
+          </a:solidFill>
+          <a:ln>
+            <a:solidFill>
+              <a:schemeClr val="tx1"/>
+            </a:solidFill>
+          </a:ln>
+        </p:spPr>
+        <p:style>
+          <a:lnRef idx="2">
+            <a:schemeClr val="accent1">
+              <a:shade val="50000"/>
+            </a:schemeClr>
+          </a:lnRef>
+          <a:fillRef idx="1">
+            <a:schemeClr val="accent1"/>
+          </a:fillRef>
+          <a:effectRef idx="0">
+            <a:schemeClr val="accent1"/>
+          </a:effectRef>
+          <a:fontRef idx="minor">
+            <a:schemeClr val="lt1"/>
+          </a:fontRef>
+        </p:style>
+        <p:txBody>
+          <a:bodyPr rtlCol="0" anchor="ctr"/>
+          <a:lstStyle/>
+          <a:p>
+            <a:pPr algn="ctr"/>
+            <a:endParaRPr lang="en-US"/>
+          </a:p>
+        </p:txBody>
+      </p:sp>
+      <p:sp>
+        <p:nvSpPr>
+          <p:cNvPr id="18" name="Rectangle 17">
+            <a:extLst>
+              <a:ext uri="{FF2B5EF4-FFF2-40B4-BE49-F238E27FC236}">
+                <a16:creationId xmlns:a16="http://schemas.microsoft.com/office/drawing/2014/main" id="{426CC7E2-CF2F-4566-9137-1922CF4F4217}"/>
+              </a:ext>
+            </a:extLst>
+          </p:cNvPr>
+          <p:cNvSpPr/>
+          <p:nvPr/>
+        </p:nvSpPr>
+        <p:spPr>
+          <a:xfrm>
+            <a:off x="6673357" y="1195782"/>
+            <a:ext cx="386861" cy="905608"/>
+          </a:xfrm>
+          <a:prstGeom prst="rect">
+            <a:avLst/>
+          </a:prstGeom>
+          <a:solidFill>
+            <a:srgbClr val="09FF38">
+              <a:alpha val="60000"/>
+            </a:srgbClr>
+          </a:solidFill>
+          <a:ln>
+            <a:solidFill>
+              <a:schemeClr val="tx1"/>
+            </a:solidFill>
+          </a:ln>
+        </p:spPr>
+        <p:style>
+          <a:lnRef idx="2">
+            <a:schemeClr val="accent1">
+              <a:shade val="50000"/>
+            </a:schemeClr>
+          </a:lnRef>
+          <a:fillRef idx="1">
+            <a:schemeClr val="accent1"/>
+          </a:fillRef>
+          <a:effectRef idx="0">
+            <a:schemeClr val="accent1"/>
+          </a:effectRef>
+          <a:fontRef idx="minor">
+            <a:schemeClr val="lt1"/>
+          </a:fontRef>
+        </p:style>
+        <p:txBody>
+          <a:bodyPr rtlCol="0" anchor="ctr"/>
+          <a:lstStyle/>
+          <a:p>
+            <a:pPr algn="ctr"/>
+            <a:endParaRPr lang="en-US"/>
+          </a:p>
+        </p:txBody>
+      </p:sp>
+      <p:sp>
+        <p:nvSpPr>
+          <p:cNvPr id="19" name="Rectangle 18">
+            <a:extLst>
+              <a:ext uri="{FF2B5EF4-FFF2-40B4-BE49-F238E27FC236}">
+                <a16:creationId xmlns:a16="http://schemas.microsoft.com/office/drawing/2014/main" id="{18122C16-C10A-4A4B-92B1-A7A76DD3EEBA}"/>
+              </a:ext>
+            </a:extLst>
+          </p:cNvPr>
+          <p:cNvSpPr/>
+          <p:nvPr/>
+        </p:nvSpPr>
+        <p:spPr>
+          <a:xfrm>
+            <a:off x="7060218" y="1195782"/>
+            <a:ext cx="386861" cy="905608"/>
+          </a:xfrm>
+          <a:prstGeom prst="rect">
+            <a:avLst/>
+          </a:prstGeom>
+          <a:solidFill>
+            <a:srgbClr val="FFC000">
+              <a:alpha val="60000"/>
+            </a:srgbClr>
+          </a:solidFill>
+          <a:ln>
+            <a:solidFill>
+              <a:schemeClr val="tx1"/>
+            </a:solidFill>
+          </a:ln>
+        </p:spPr>
+        <p:style>
+          <a:lnRef idx="2">
+            <a:schemeClr val="accent1">
+              <a:shade val="50000"/>
+            </a:schemeClr>
+          </a:lnRef>
+          <a:fillRef idx="1">
+            <a:schemeClr val="accent1"/>
+          </a:fillRef>
+          <a:effectRef idx="0">
+            <a:schemeClr val="accent1"/>
+          </a:effectRef>
+          <a:fontRef idx="minor">
+            <a:schemeClr val="lt1"/>
+          </a:fontRef>
+        </p:style>
+        <p:txBody>
+          <a:bodyPr rtlCol="0" anchor="ctr"/>
+          <a:lstStyle/>
+          <a:p>
+            <a:pPr algn="ctr"/>
+            <a:endParaRPr lang="en-US"/>
+          </a:p>
+        </p:txBody>
+      </p:sp>
+      <p:sp>
+        <p:nvSpPr>
+          <p:cNvPr id="20" name="Rectangle 19">
+            <a:extLst>
+              <a:ext uri="{FF2B5EF4-FFF2-40B4-BE49-F238E27FC236}">
+                <a16:creationId xmlns:a16="http://schemas.microsoft.com/office/drawing/2014/main" id="{EC55C724-0BFB-4241-A5E9-1248B6962214}"/>
+              </a:ext>
+            </a:extLst>
+          </p:cNvPr>
+          <p:cNvSpPr/>
+          <p:nvPr/>
+        </p:nvSpPr>
+        <p:spPr>
+          <a:xfrm>
+            <a:off x="7447079" y="1195782"/>
+            <a:ext cx="386861" cy="905608"/>
+          </a:xfrm>
+          <a:prstGeom prst="rect">
+            <a:avLst/>
+          </a:prstGeom>
+          <a:solidFill>
+            <a:srgbClr val="FFC000">
+              <a:alpha val="60000"/>
+            </a:srgbClr>
+          </a:solidFill>
+          <a:ln>
+            <a:solidFill>
+              <a:schemeClr val="tx1"/>
+            </a:solidFill>
+          </a:ln>
+        </p:spPr>
+        <p:style>
+          <a:lnRef idx="2">
+            <a:schemeClr val="accent1">
+              <a:shade val="50000"/>
+            </a:schemeClr>
+          </a:lnRef>
+          <a:fillRef idx="1">
+            <a:schemeClr val="accent1"/>
+          </a:fillRef>
+          <a:effectRef idx="0">
+            <a:schemeClr val="accent1"/>
+          </a:effectRef>
+          <a:fontRef idx="minor">
+            <a:schemeClr val="lt1"/>
+          </a:fontRef>
+        </p:style>
+        <p:txBody>
+          <a:bodyPr rtlCol="0" anchor="ctr"/>
+          <a:lstStyle/>
+          <a:p>
+            <a:pPr algn="ctr"/>
+            <a:endParaRPr lang="en-US"/>
+          </a:p>
+        </p:txBody>
+      </p:sp>
+      <p:sp>
+        <p:nvSpPr>
+          <p:cNvPr id="24" name="TextBox 23">
+            <a:extLst>
+              <a:ext uri="{FF2B5EF4-FFF2-40B4-BE49-F238E27FC236}">
+                <a16:creationId xmlns:a16="http://schemas.microsoft.com/office/drawing/2014/main" id="{D684ACAA-EC90-45EF-8F3B-7A7EBDCB19BC}"/>
+              </a:ext>
+            </a:extLst>
+          </p:cNvPr>
+          <p:cNvSpPr txBox="1"/>
+          <p:nvPr/>
+        </p:nvSpPr>
+        <p:spPr>
+          <a:xfrm>
+            <a:off x="2704314" y="826450"/>
+            <a:ext cx="587725" cy="369332"/>
+          </a:xfrm>
+          <a:prstGeom prst="rect">
+            <a:avLst/>
+          </a:prstGeom>
+          <a:noFill/>
+        </p:spPr>
+        <p:txBody>
+          <a:bodyPr wrap="none" rtlCol="0">
+            <a:spAutoFit/>
           </a:bodyPr>
-          <a:lstStyle>
-            <a:defPPr>
-              <a:defRPr lang="en-US"/>
-            </a:defPPr>
-            <a:lvl1pPr marL="0" algn="l" defTabSz="914400" rtl="0" eaLnBrk="1" latinLnBrk="0" hangingPunct="1">
-              <a:defRPr sz="1800" kern="1200">
-                <a:solidFill>
-                  <a:schemeClr val="lt1"/>
-                </a:solidFill>
-                <a:latin typeface="+mn-lt"/>
-                <a:ea typeface="+mn-ea"/>
-                <a:cs typeface="+mn-cs"/>
-              </a:defRPr>
-            </a:lvl1pPr>
-            <a:lvl2pPr marL="457200" algn="l" defTabSz="914400" rtl="0" eaLnBrk="1" latinLnBrk="0" hangingPunct="1">
-              <a:defRPr sz="1800" kern="1200">
-                <a:solidFill>
-                  <a:schemeClr val="lt1"/>
-                </a:solidFill>
-                <a:latin typeface="+mn-lt"/>
-                <a:ea typeface="+mn-ea"/>
-                <a:cs typeface="+mn-cs"/>
-              </a:defRPr>
-            </a:lvl2pPr>
-            <a:lvl3pPr marL="914400" algn="l" defTabSz="914400" rtl="0" eaLnBrk="1" latinLnBrk="0" hangingPunct="1">
-              <a:defRPr sz="1800" kern="1200">
-                <a:solidFill>
-                  <a:schemeClr val="lt1"/>
-                </a:solidFill>
-                <a:latin typeface="+mn-lt"/>
-                <a:ea typeface="+mn-ea"/>
-                <a:cs typeface="+mn-cs"/>
-              </a:defRPr>
-            </a:lvl3pPr>
-            <a:lvl4pPr marL="1371600" algn="l" defTabSz="914400" rtl="0" eaLnBrk="1" latinLnBrk="0" hangingPunct="1">
-              <a:defRPr sz="1800" kern="1200">
-                <a:solidFill>
-                  <a:schemeClr val="lt1"/>
-                </a:solidFill>
-                <a:latin typeface="+mn-lt"/>
-                <a:ea typeface="+mn-ea"/>
-                <a:cs typeface="+mn-cs"/>
-              </a:defRPr>
-            </a:lvl4pPr>
-            <a:lvl5pPr marL="1828800" algn="l" defTabSz="914400" rtl="0" eaLnBrk="1" latinLnBrk="0" hangingPunct="1">
-              <a:defRPr sz="1800" kern="1200">
-                <a:solidFill>
-                  <a:schemeClr val="lt1"/>
-                </a:solidFill>
-                <a:latin typeface="+mn-lt"/>
-                <a:ea typeface="+mn-ea"/>
-                <a:cs typeface="+mn-cs"/>
-              </a:defRPr>
-            </a:lvl5pPr>
-            <a:lvl6pPr marL="2286000" algn="l" defTabSz="914400" rtl="0" eaLnBrk="1" latinLnBrk="0" hangingPunct="1">
-              <a:defRPr sz="1800" kern="1200">
-                <a:solidFill>
-                  <a:schemeClr val="lt1"/>
-                </a:solidFill>
-                <a:latin typeface="+mn-lt"/>
-                <a:ea typeface="+mn-ea"/>
-                <a:cs typeface="+mn-cs"/>
-              </a:defRPr>
-            </a:lvl6pPr>
-            <a:lvl7pPr marL="2743200" algn="l" defTabSz="914400" rtl="0" eaLnBrk="1" latinLnBrk="0" hangingPunct="1">
-              <a:defRPr sz="1800" kern="1200">
-                <a:solidFill>
-                  <a:schemeClr val="lt1"/>
-                </a:solidFill>
-                <a:latin typeface="+mn-lt"/>
-                <a:ea typeface="+mn-ea"/>
-                <a:cs typeface="+mn-cs"/>
-              </a:defRPr>
-            </a:lvl7pPr>
-            <a:lvl8pPr marL="3200400" algn="l" defTabSz="914400" rtl="0" eaLnBrk="1" latinLnBrk="0" hangingPunct="1">
-              <a:defRPr sz="1800" kern="1200">
-                <a:solidFill>
-                  <a:schemeClr val="lt1"/>
-                </a:solidFill>
-                <a:latin typeface="+mn-lt"/>
-                <a:ea typeface="+mn-ea"/>
-                <a:cs typeface="+mn-cs"/>
-              </a:defRPr>
-            </a:lvl8pPr>
-            <a:lvl9pPr marL="3657600" algn="l" defTabSz="914400" rtl="0" eaLnBrk="1" latinLnBrk="0" hangingPunct="1">
-              <a:defRPr sz="1800" kern="1200">
-                <a:solidFill>
-                  <a:schemeClr val="lt1"/>
-                </a:solidFill>
-                <a:latin typeface="+mn-lt"/>
-                <a:ea typeface="+mn-ea"/>
-                <a:cs typeface="+mn-cs"/>
-              </a:defRPr>
-            </a:lvl9pPr>
-          </a:lstStyle>
-          <a:p>
-            <a:r>
-              <a:rPr lang="en-US" dirty="0">
-                <a:solidFill>
-                  <a:sysClr val="windowText" lastClr="000000"/>
-                </a:solidFill>
-              </a:rPr>
-              <a:t>Friction</a:t>
-            </a:r>
-          </a:p>
-          <a:p>
-            <a:r>
-              <a:rPr lang="en-US" dirty="0">
-                <a:solidFill>
-                  <a:sysClr val="windowText" lastClr="000000"/>
-                </a:solidFill>
-              </a:rPr>
-              <a:t>Mass</a:t>
-            </a:r>
-          </a:p>
-          <a:p>
-            <a:r>
-              <a:rPr lang="en-US" dirty="0" err="1">
-                <a:solidFill>
-                  <a:sysClr val="windowText" lastClr="000000"/>
-                </a:solidFill>
-              </a:rPr>
-              <a:t>RotationalMass</a:t>
-            </a:r>
-            <a:endParaRPr lang="en-US" dirty="0">
-              <a:solidFill>
-                <a:sysClr val="windowText" lastClr="000000"/>
-              </a:solidFill>
-            </a:endParaRPr>
-          </a:p>
-          <a:p>
-            <a:r>
-              <a:rPr lang="en-US" dirty="0" err="1">
-                <a:solidFill>
-                  <a:sysClr val="windowText" lastClr="000000"/>
-                </a:solidFill>
-              </a:rPr>
-              <a:t>Throttle_to_Thrust</a:t>
-            </a:r>
-            <a:endParaRPr lang="en-US" dirty="0">
-              <a:solidFill>
-                <a:sysClr val="windowText" lastClr="000000"/>
-              </a:solidFill>
-            </a:endParaRPr>
+          <a:lstStyle/>
+          <a:p>
+            <a:r>
+              <a:rPr lang="en-US" dirty="0"/>
+              <a:t>gate</a:t>
+            </a:r>
+          </a:p>
+        </p:txBody>
+      </p:sp>
+      <p:sp>
+        <p:nvSpPr>
+          <p:cNvPr id="25" name="TextBox 24">
+            <a:extLst>
+              <a:ext uri="{FF2B5EF4-FFF2-40B4-BE49-F238E27FC236}">
+                <a16:creationId xmlns:a16="http://schemas.microsoft.com/office/drawing/2014/main" id="{C2B2B18E-5FDA-459E-BE2F-1BB02E48D7F5}"/>
+              </a:ext>
+            </a:extLst>
+          </p:cNvPr>
+          <p:cNvSpPr txBox="1"/>
+          <p:nvPr/>
+        </p:nvSpPr>
+        <p:spPr>
+          <a:xfrm>
+            <a:off x="5444708" y="3105834"/>
+            <a:ext cx="5580846" cy="2862322"/>
+          </a:xfrm>
+          <a:prstGeom prst="rect">
+            <a:avLst/>
+          </a:prstGeom>
+          <a:noFill/>
+        </p:spPr>
+        <p:txBody>
+          <a:bodyPr wrap="square" rtlCol="0">
+            <a:spAutoFit/>
+          </a:bodyPr>
+          <a:lstStyle/>
+          <a:p>
+            <a:r>
+              <a:rPr lang="en-US" dirty="0"/>
+              <a:t>Global </a:t>
+            </a:r>
+            <a:r>
+              <a:rPr lang="en-US" dirty="0" err="1"/>
+              <a:t>Current_gate</a:t>
+            </a:r>
+            <a:r>
+              <a:rPr lang="en-US" dirty="0"/>
+              <a:t> = 0</a:t>
+            </a:r>
+          </a:p>
+          <a:p>
+            <a:r>
+              <a:rPr lang="en-US" dirty="0" err="1"/>
+              <a:t>is_data</a:t>
+            </a:r>
+            <a:r>
+              <a:rPr lang="en-US" dirty="0"/>
+              <a:t> = True</a:t>
+            </a:r>
+          </a:p>
+          <a:p>
+            <a:r>
+              <a:rPr lang="en-US" dirty="0"/>
+              <a:t>While </a:t>
+            </a:r>
+            <a:r>
+              <a:rPr lang="en-US" dirty="0" err="1"/>
+              <a:t>is_data</a:t>
+            </a:r>
+            <a:r>
+              <a:rPr lang="en-US" dirty="0"/>
+              <a:t>:</a:t>
+            </a:r>
+          </a:p>
+          <a:p>
+            <a:pPr marL="285750" indent="-285750">
+              <a:buFontTx/>
+              <a:buChar char="-"/>
+            </a:pPr>
+            <a:r>
+              <a:rPr lang="en-US" dirty="0"/>
+              <a:t>If </a:t>
+            </a:r>
+            <a:r>
+              <a:rPr lang="en-US" dirty="0" err="1"/>
+              <a:t>first_calc</a:t>
+            </a:r>
+            <a:r>
+              <a:rPr lang="en-US" dirty="0"/>
+              <a:t> or </a:t>
+            </a:r>
+            <a:r>
+              <a:rPr lang="en-US" dirty="0" err="1"/>
+              <a:t>different_azimuth</a:t>
+            </a:r>
+            <a:r>
+              <a:rPr lang="en-US" dirty="0"/>
+              <a:t> from last gate</a:t>
+            </a:r>
+          </a:p>
+          <a:p>
+            <a:pPr marL="742950" lvl="1" indent="-285750">
+              <a:buFontTx/>
+              <a:buChar char="-"/>
+            </a:pPr>
+            <a:r>
+              <a:rPr lang="en-US" dirty="0"/>
+              <a:t>Calc downline speed, offline position for data</a:t>
+            </a:r>
+          </a:p>
+          <a:p>
+            <a:pPr marL="285750" indent="-285750">
+              <a:buFontTx/>
+              <a:buChar char="-"/>
+            </a:pPr>
+            <a:r>
+              <a:rPr lang="en-US" dirty="0"/>
+              <a:t>Calculate points in gate</a:t>
+            </a:r>
+          </a:p>
+          <a:p>
+            <a:pPr marL="285750" indent="-285750">
+              <a:buFontTx/>
+              <a:buChar char="-"/>
+            </a:pPr>
+            <a:r>
+              <a:rPr lang="en-US" dirty="0"/>
+              <a:t>If </a:t>
+            </a:r>
+            <a:r>
+              <a:rPr lang="en-US" dirty="0" err="1"/>
+              <a:t>is_data</a:t>
+            </a:r>
+            <a:r>
+              <a:rPr lang="en-US" dirty="0"/>
+              <a:t>:</a:t>
+            </a:r>
+          </a:p>
+          <a:p>
+            <a:pPr marL="742950" lvl="1" indent="-285750">
+              <a:buFontTx/>
+              <a:buChar char="-"/>
+            </a:pPr>
+            <a:r>
+              <a:rPr lang="en-US" dirty="0"/>
+              <a:t>Calculate fitness score in gate</a:t>
+            </a:r>
+          </a:p>
+          <a:p>
+            <a:pPr marL="742950" lvl="1" indent="-285750">
+              <a:buFontTx/>
+              <a:buChar char="-"/>
+            </a:pPr>
+            <a:r>
+              <a:rPr lang="en-US" dirty="0" err="1"/>
+              <a:t>Current_gate</a:t>
+            </a:r>
+            <a:r>
+              <a:rPr lang="en-US" dirty="0"/>
+              <a:t> ++</a:t>
+            </a:r>
+          </a:p>
+          <a:p>
+            <a:pPr marL="285750" indent="-285750">
+              <a:buFontTx/>
+              <a:buChar char="-"/>
+            </a:pPr>
+            <a:endParaRPr lang="en-US" dirty="0"/>
+          </a:p>
+        </p:txBody>
+      </p:sp>
+      <p:sp>
+        <p:nvSpPr>
+          <p:cNvPr id="26" name="Rectangle 25">
+            <a:extLst>
+              <a:ext uri="{FF2B5EF4-FFF2-40B4-BE49-F238E27FC236}">
+                <a16:creationId xmlns:a16="http://schemas.microsoft.com/office/drawing/2014/main" id="{564501A9-E021-4A94-9BF1-70A3DAEACA4C}"/>
+              </a:ext>
+            </a:extLst>
+          </p:cNvPr>
+          <p:cNvSpPr/>
+          <p:nvPr/>
+        </p:nvSpPr>
+        <p:spPr>
+          <a:xfrm>
+            <a:off x="7833940" y="1195782"/>
+            <a:ext cx="386861" cy="905608"/>
+          </a:xfrm>
+          <a:prstGeom prst="rect">
+            <a:avLst/>
+          </a:prstGeom>
+          <a:solidFill>
+            <a:srgbClr val="FFC000">
+              <a:alpha val="60000"/>
+            </a:srgbClr>
+          </a:solidFill>
+          <a:ln>
+            <a:solidFill>
+              <a:schemeClr val="tx1"/>
+            </a:solidFill>
+          </a:ln>
+        </p:spPr>
+        <p:style>
+          <a:lnRef idx="2">
+            <a:schemeClr val="accent1">
+              <a:shade val="50000"/>
+            </a:schemeClr>
+          </a:lnRef>
+          <a:fillRef idx="1">
+            <a:schemeClr val="accent1"/>
+          </a:fillRef>
+          <a:effectRef idx="0">
+            <a:schemeClr val="accent1"/>
+          </a:effectRef>
+          <a:fontRef idx="minor">
+            <a:schemeClr val="lt1"/>
+          </a:fontRef>
+        </p:style>
+        <p:txBody>
+          <a:bodyPr rtlCol="0" anchor="ctr"/>
+          <a:lstStyle/>
+          <a:p>
+            <a:pPr algn="ctr"/>
+            <a:endParaRPr lang="en-US"/>
+          </a:p>
+        </p:txBody>
+      </p:sp>
+      <p:sp>
+        <p:nvSpPr>
+          <p:cNvPr id="28" name="TextBox 27">
+            <a:extLst>
+              <a:ext uri="{FF2B5EF4-FFF2-40B4-BE49-F238E27FC236}">
+                <a16:creationId xmlns:a16="http://schemas.microsoft.com/office/drawing/2014/main" id="{024D560E-A9A4-4BC1-9A31-A2BADAB2C244}"/>
+              </a:ext>
+            </a:extLst>
+          </p:cNvPr>
+          <p:cNvSpPr txBox="1"/>
+          <p:nvPr/>
+        </p:nvSpPr>
+        <p:spPr>
+          <a:xfrm>
+            <a:off x="2061403" y="1916724"/>
+            <a:ext cx="752129" cy="369332"/>
+          </a:xfrm>
+          <a:prstGeom prst="rect">
+            <a:avLst/>
+          </a:prstGeom>
+          <a:noFill/>
+        </p:spPr>
+        <p:txBody>
+          <a:bodyPr wrap="none" rtlCol="0">
+            <a:spAutoFit/>
+          </a:bodyPr>
+          <a:lstStyle/>
+          <a:p>
+            <a:r>
+              <a:rPr lang="en-US" dirty="0"/>
+              <a:t>runup</a:t>
+            </a:r>
+          </a:p>
+        </p:txBody>
+      </p:sp>
+      <p:sp>
+        <p:nvSpPr>
+          <p:cNvPr id="29" name="TextBox 28">
+            <a:extLst>
+              <a:ext uri="{FF2B5EF4-FFF2-40B4-BE49-F238E27FC236}">
+                <a16:creationId xmlns:a16="http://schemas.microsoft.com/office/drawing/2014/main" id="{069DD293-A79A-48E8-8808-B86C79350F7E}"/>
+              </a:ext>
+            </a:extLst>
+          </p:cNvPr>
+          <p:cNvSpPr txBox="1"/>
+          <p:nvPr/>
+        </p:nvSpPr>
+        <p:spPr>
+          <a:xfrm>
+            <a:off x="8339674" y="1916711"/>
+            <a:ext cx="829073" cy="369332"/>
+          </a:xfrm>
+          <a:prstGeom prst="rect">
+            <a:avLst/>
+          </a:prstGeom>
+          <a:noFill/>
+        </p:spPr>
+        <p:txBody>
+          <a:bodyPr wrap="none" rtlCol="0">
+            <a:spAutoFit/>
+          </a:bodyPr>
+          <a:lstStyle/>
+          <a:p>
+            <a:r>
+              <a:rPr lang="en-US" dirty="0"/>
+              <a:t>runout</a:t>
+            </a:r>
+          </a:p>
+        </p:txBody>
+      </p:sp>
+      <p:sp>
+        <p:nvSpPr>
+          <p:cNvPr id="32" name="Left Brace 31">
+            <a:extLst>
+              <a:ext uri="{FF2B5EF4-FFF2-40B4-BE49-F238E27FC236}">
+                <a16:creationId xmlns:a16="http://schemas.microsoft.com/office/drawing/2014/main" id="{900D891F-3CD9-4A40-AC33-96493A0FF028}"/>
+              </a:ext>
+            </a:extLst>
+          </p:cNvPr>
+          <p:cNvSpPr/>
+          <p:nvPr/>
+        </p:nvSpPr>
+        <p:spPr>
+          <a:xfrm rot="16200000">
+            <a:off x="2363500" y="1541611"/>
+            <a:ext cx="162618" cy="587582"/>
+          </a:xfrm>
+          <a:prstGeom prst="leftBrace">
+            <a:avLst/>
+          </a:prstGeom>
+        </p:spPr>
+        <p:style>
+          <a:lnRef idx="1">
+            <a:schemeClr val="accent1"/>
+          </a:lnRef>
+          <a:fillRef idx="0">
+            <a:schemeClr val="accent1"/>
+          </a:fillRef>
+          <a:effectRef idx="0">
+            <a:schemeClr val="accent1"/>
+          </a:effectRef>
+          <a:fontRef idx="minor">
+            <a:schemeClr val="tx1"/>
+          </a:fontRef>
+        </p:style>
+        <p:txBody>
+          <a:bodyPr rtlCol="0" anchor="ctr"/>
+          <a:lstStyle/>
+          <a:p>
+            <a:pPr algn="ctr"/>
+            <a:endParaRPr lang="en-US"/>
+          </a:p>
+        </p:txBody>
+      </p:sp>
+      <p:sp>
+        <p:nvSpPr>
+          <p:cNvPr id="33" name="Left Brace 32">
+            <a:extLst>
+              <a:ext uri="{FF2B5EF4-FFF2-40B4-BE49-F238E27FC236}">
+                <a16:creationId xmlns:a16="http://schemas.microsoft.com/office/drawing/2014/main" id="{F5B52965-E1D4-4CE4-B1F7-BC864C62620B}"/>
+              </a:ext>
+            </a:extLst>
+          </p:cNvPr>
+          <p:cNvSpPr/>
+          <p:nvPr/>
+        </p:nvSpPr>
+        <p:spPr>
+          <a:xfrm rot="16200000">
+            <a:off x="8561603" y="1457231"/>
+            <a:ext cx="202205" cy="795928"/>
+          </a:xfrm>
+          <a:prstGeom prst="leftBrace">
+            <a:avLst/>
+          </a:prstGeom>
+        </p:spPr>
+        <p:style>
+          <a:lnRef idx="1">
+            <a:schemeClr val="accent1"/>
+          </a:lnRef>
+          <a:fillRef idx="0">
+            <a:schemeClr val="accent1"/>
+          </a:fillRef>
+          <a:effectRef idx="0">
+            <a:schemeClr val="accent1"/>
+          </a:effectRef>
+          <a:fontRef idx="minor">
+            <a:schemeClr val="tx1"/>
+          </a:fontRef>
+        </p:style>
+        <p:txBody>
+          <a:bodyPr rtlCol="0" anchor="ctr"/>
+          <a:lstStyle/>
+          <a:p>
+            <a:pPr algn="ctr"/>
+            <a:endParaRPr lang="en-US"/>
+          </a:p>
+        </p:txBody>
+      </p:sp>
+      <p:sp>
+        <p:nvSpPr>
+          <p:cNvPr id="35" name="Freeform: Shape 34">
+            <a:extLst>
+              <a:ext uri="{FF2B5EF4-FFF2-40B4-BE49-F238E27FC236}">
+                <a16:creationId xmlns:a16="http://schemas.microsoft.com/office/drawing/2014/main" id="{F536115B-40D3-4B43-BA2C-3DFD932E8B3D}"/>
+              </a:ext>
+            </a:extLst>
+          </p:cNvPr>
+          <p:cNvSpPr/>
+          <p:nvPr/>
+        </p:nvSpPr>
+        <p:spPr>
+          <a:xfrm>
+            <a:off x="1485897" y="1400214"/>
+            <a:ext cx="7280031" cy="863795"/>
+          </a:xfrm>
+          <a:custGeom>
+            <a:avLst/>
+            <a:gdLst>
+              <a:gd name="connsiteX0" fmla="*/ 0 w 7280031"/>
+              <a:gd name="connsiteY0" fmla="*/ 591233 h 863795"/>
+              <a:gd name="connsiteX1" fmla="*/ 61546 w 7280031"/>
+              <a:gd name="connsiteY1" fmla="*/ 564856 h 863795"/>
+              <a:gd name="connsiteX2" fmla="*/ 123092 w 7280031"/>
+              <a:gd name="connsiteY2" fmla="*/ 556064 h 863795"/>
+              <a:gd name="connsiteX3" fmla="*/ 202223 w 7280031"/>
+              <a:gd name="connsiteY3" fmla="*/ 538479 h 863795"/>
+              <a:gd name="connsiteX4" fmla="*/ 536331 w 7280031"/>
+              <a:gd name="connsiteY4" fmla="*/ 520895 h 863795"/>
+              <a:gd name="connsiteX5" fmla="*/ 606669 w 7280031"/>
+              <a:gd name="connsiteY5" fmla="*/ 503310 h 863795"/>
+              <a:gd name="connsiteX6" fmla="*/ 633046 w 7280031"/>
+              <a:gd name="connsiteY6" fmla="*/ 485725 h 863795"/>
+              <a:gd name="connsiteX7" fmla="*/ 729761 w 7280031"/>
+              <a:gd name="connsiteY7" fmla="*/ 459348 h 863795"/>
+              <a:gd name="connsiteX8" fmla="*/ 1336431 w 7280031"/>
+              <a:gd name="connsiteY8" fmla="*/ 468141 h 863795"/>
+              <a:gd name="connsiteX9" fmla="*/ 1521069 w 7280031"/>
+              <a:gd name="connsiteY9" fmla="*/ 450556 h 863795"/>
+              <a:gd name="connsiteX10" fmla="*/ 1573823 w 7280031"/>
+              <a:gd name="connsiteY10" fmla="*/ 406595 h 863795"/>
+              <a:gd name="connsiteX11" fmla="*/ 1635369 w 7280031"/>
+              <a:gd name="connsiteY11" fmla="*/ 371425 h 863795"/>
+              <a:gd name="connsiteX12" fmla="*/ 1661746 w 7280031"/>
+              <a:gd name="connsiteY12" fmla="*/ 353841 h 863795"/>
+              <a:gd name="connsiteX13" fmla="*/ 1679331 w 7280031"/>
+              <a:gd name="connsiteY13" fmla="*/ 327464 h 863795"/>
+              <a:gd name="connsiteX14" fmla="*/ 1705708 w 7280031"/>
+              <a:gd name="connsiteY14" fmla="*/ 318671 h 863795"/>
+              <a:gd name="connsiteX15" fmla="*/ 1767254 w 7280031"/>
+              <a:gd name="connsiteY15" fmla="*/ 292295 h 863795"/>
+              <a:gd name="connsiteX16" fmla="*/ 1837592 w 7280031"/>
+              <a:gd name="connsiteY16" fmla="*/ 257125 h 863795"/>
+              <a:gd name="connsiteX17" fmla="*/ 1863969 w 7280031"/>
+              <a:gd name="connsiteY17" fmla="*/ 239541 h 863795"/>
+              <a:gd name="connsiteX18" fmla="*/ 1916723 w 7280031"/>
+              <a:gd name="connsiteY18" fmla="*/ 221956 h 863795"/>
+              <a:gd name="connsiteX19" fmla="*/ 1934308 w 7280031"/>
+              <a:gd name="connsiteY19" fmla="*/ 195579 h 863795"/>
+              <a:gd name="connsiteX20" fmla="*/ 1987061 w 7280031"/>
+              <a:gd name="connsiteY20" fmla="*/ 177995 h 863795"/>
+              <a:gd name="connsiteX21" fmla="*/ 2057400 w 7280031"/>
+              <a:gd name="connsiteY21" fmla="*/ 134033 h 863795"/>
+              <a:gd name="connsiteX22" fmla="*/ 2092569 w 7280031"/>
+              <a:gd name="connsiteY22" fmla="*/ 116448 h 863795"/>
+              <a:gd name="connsiteX23" fmla="*/ 2154115 w 7280031"/>
+              <a:gd name="connsiteY23" fmla="*/ 90071 h 863795"/>
+              <a:gd name="connsiteX24" fmla="*/ 2180492 w 7280031"/>
+              <a:gd name="connsiteY24" fmla="*/ 63695 h 863795"/>
+              <a:gd name="connsiteX25" fmla="*/ 2206869 w 7280031"/>
+              <a:gd name="connsiteY25" fmla="*/ 54902 h 863795"/>
+              <a:gd name="connsiteX26" fmla="*/ 2277208 w 7280031"/>
+              <a:gd name="connsiteY26" fmla="*/ 28525 h 863795"/>
+              <a:gd name="connsiteX27" fmla="*/ 2479431 w 7280031"/>
+              <a:gd name="connsiteY27" fmla="*/ 19733 h 863795"/>
+              <a:gd name="connsiteX28" fmla="*/ 2567354 w 7280031"/>
+              <a:gd name="connsiteY28" fmla="*/ 37318 h 863795"/>
+              <a:gd name="connsiteX29" fmla="*/ 2593731 w 7280031"/>
+              <a:gd name="connsiteY29" fmla="*/ 46110 h 863795"/>
+              <a:gd name="connsiteX30" fmla="*/ 2620108 w 7280031"/>
+              <a:gd name="connsiteY30" fmla="*/ 63695 h 863795"/>
+              <a:gd name="connsiteX31" fmla="*/ 2646485 w 7280031"/>
+              <a:gd name="connsiteY31" fmla="*/ 72487 h 863795"/>
+              <a:gd name="connsiteX32" fmla="*/ 2655277 w 7280031"/>
+              <a:gd name="connsiteY32" fmla="*/ 98864 h 863795"/>
+              <a:gd name="connsiteX33" fmla="*/ 2681654 w 7280031"/>
+              <a:gd name="connsiteY33" fmla="*/ 125241 h 863795"/>
+              <a:gd name="connsiteX34" fmla="*/ 2743200 w 7280031"/>
+              <a:gd name="connsiteY34" fmla="*/ 160410 h 863795"/>
+              <a:gd name="connsiteX35" fmla="*/ 2778369 w 7280031"/>
+              <a:gd name="connsiteY35" fmla="*/ 195579 h 863795"/>
+              <a:gd name="connsiteX36" fmla="*/ 2795954 w 7280031"/>
+              <a:gd name="connsiteY36" fmla="*/ 221956 h 863795"/>
+              <a:gd name="connsiteX37" fmla="*/ 2822331 w 7280031"/>
+              <a:gd name="connsiteY37" fmla="*/ 248333 h 863795"/>
+              <a:gd name="connsiteX38" fmla="*/ 2883877 w 7280031"/>
+              <a:gd name="connsiteY38" fmla="*/ 283502 h 863795"/>
+              <a:gd name="connsiteX39" fmla="*/ 2954215 w 7280031"/>
+              <a:gd name="connsiteY39" fmla="*/ 327464 h 863795"/>
+              <a:gd name="connsiteX40" fmla="*/ 2980592 w 7280031"/>
+              <a:gd name="connsiteY40" fmla="*/ 345048 h 863795"/>
+              <a:gd name="connsiteX41" fmla="*/ 3024554 w 7280031"/>
+              <a:gd name="connsiteY41" fmla="*/ 362633 h 863795"/>
+              <a:gd name="connsiteX42" fmla="*/ 3086100 w 7280031"/>
+              <a:gd name="connsiteY42" fmla="*/ 397802 h 863795"/>
+              <a:gd name="connsiteX43" fmla="*/ 3525715 w 7280031"/>
+              <a:gd name="connsiteY43" fmla="*/ 406595 h 863795"/>
+              <a:gd name="connsiteX44" fmla="*/ 3640015 w 7280031"/>
+              <a:gd name="connsiteY44" fmla="*/ 432971 h 863795"/>
+              <a:gd name="connsiteX45" fmla="*/ 3842238 w 7280031"/>
+              <a:gd name="connsiteY45" fmla="*/ 415387 h 863795"/>
+              <a:gd name="connsiteX46" fmla="*/ 3877408 w 7280031"/>
+              <a:gd name="connsiteY46" fmla="*/ 389010 h 863795"/>
+              <a:gd name="connsiteX47" fmla="*/ 3938954 w 7280031"/>
+              <a:gd name="connsiteY47" fmla="*/ 362633 h 863795"/>
+              <a:gd name="connsiteX48" fmla="*/ 3974123 w 7280031"/>
+              <a:gd name="connsiteY48" fmla="*/ 318671 h 863795"/>
+              <a:gd name="connsiteX49" fmla="*/ 4018085 w 7280031"/>
+              <a:gd name="connsiteY49" fmla="*/ 292295 h 863795"/>
+              <a:gd name="connsiteX50" fmla="*/ 4070838 w 7280031"/>
+              <a:gd name="connsiteY50" fmla="*/ 257125 h 863795"/>
+              <a:gd name="connsiteX51" fmla="*/ 4114800 w 7280031"/>
+              <a:gd name="connsiteY51" fmla="*/ 230748 h 863795"/>
+              <a:gd name="connsiteX52" fmla="*/ 4211515 w 7280031"/>
+              <a:gd name="connsiteY52" fmla="*/ 169202 h 863795"/>
+              <a:gd name="connsiteX53" fmla="*/ 4246685 w 7280031"/>
+              <a:gd name="connsiteY53" fmla="*/ 160410 h 863795"/>
+              <a:gd name="connsiteX54" fmla="*/ 4325815 w 7280031"/>
+              <a:gd name="connsiteY54" fmla="*/ 134033 h 863795"/>
+              <a:gd name="connsiteX55" fmla="*/ 4422531 w 7280031"/>
+              <a:gd name="connsiteY55" fmla="*/ 107656 h 863795"/>
+              <a:gd name="connsiteX56" fmla="*/ 4659923 w 7280031"/>
+              <a:gd name="connsiteY56" fmla="*/ 134033 h 863795"/>
+              <a:gd name="connsiteX57" fmla="*/ 4739054 w 7280031"/>
+              <a:gd name="connsiteY57" fmla="*/ 177995 h 863795"/>
+              <a:gd name="connsiteX58" fmla="*/ 4870938 w 7280031"/>
+              <a:gd name="connsiteY58" fmla="*/ 230748 h 863795"/>
+              <a:gd name="connsiteX59" fmla="*/ 4950069 w 7280031"/>
+              <a:gd name="connsiteY59" fmla="*/ 274710 h 863795"/>
+              <a:gd name="connsiteX60" fmla="*/ 4976446 w 7280031"/>
+              <a:gd name="connsiteY60" fmla="*/ 301087 h 863795"/>
+              <a:gd name="connsiteX61" fmla="*/ 5002823 w 7280031"/>
+              <a:gd name="connsiteY61" fmla="*/ 309879 h 863795"/>
+              <a:gd name="connsiteX62" fmla="*/ 5020408 w 7280031"/>
+              <a:gd name="connsiteY62" fmla="*/ 336256 h 863795"/>
+              <a:gd name="connsiteX63" fmla="*/ 5099538 w 7280031"/>
+              <a:gd name="connsiteY63" fmla="*/ 415387 h 863795"/>
+              <a:gd name="connsiteX64" fmla="*/ 5125915 w 7280031"/>
+              <a:gd name="connsiteY64" fmla="*/ 441764 h 863795"/>
+              <a:gd name="connsiteX65" fmla="*/ 5152292 w 7280031"/>
+              <a:gd name="connsiteY65" fmla="*/ 468141 h 863795"/>
+              <a:gd name="connsiteX66" fmla="*/ 5249008 w 7280031"/>
+              <a:gd name="connsiteY66" fmla="*/ 538479 h 863795"/>
+              <a:gd name="connsiteX67" fmla="*/ 5328138 w 7280031"/>
+              <a:gd name="connsiteY67" fmla="*/ 600025 h 863795"/>
+              <a:gd name="connsiteX68" fmla="*/ 5398477 w 7280031"/>
+              <a:gd name="connsiteY68" fmla="*/ 670364 h 863795"/>
+              <a:gd name="connsiteX69" fmla="*/ 5451231 w 7280031"/>
+              <a:gd name="connsiteY69" fmla="*/ 714325 h 863795"/>
+              <a:gd name="connsiteX70" fmla="*/ 5486400 w 7280031"/>
+              <a:gd name="connsiteY70" fmla="*/ 731910 h 863795"/>
+              <a:gd name="connsiteX71" fmla="*/ 5600700 w 7280031"/>
+              <a:gd name="connsiteY71" fmla="*/ 758287 h 863795"/>
+              <a:gd name="connsiteX72" fmla="*/ 5627077 w 7280031"/>
+              <a:gd name="connsiteY72" fmla="*/ 775871 h 863795"/>
+              <a:gd name="connsiteX73" fmla="*/ 5688623 w 7280031"/>
+              <a:gd name="connsiteY73" fmla="*/ 793456 h 863795"/>
+              <a:gd name="connsiteX74" fmla="*/ 5794131 w 7280031"/>
+              <a:gd name="connsiteY74" fmla="*/ 828625 h 863795"/>
+              <a:gd name="connsiteX75" fmla="*/ 5846885 w 7280031"/>
+              <a:gd name="connsiteY75" fmla="*/ 837418 h 863795"/>
+              <a:gd name="connsiteX76" fmla="*/ 5908431 w 7280031"/>
+              <a:gd name="connsiteY76" fmla="*/ 846210 h 863795"/>
+              <a:gd name="connsiteX77" fmla="*/ 6013938 w 7280031"/>
+              <a:gd name="connsiteY77" fmla="*/ 863795 h 863795"/>
+              <a:gd name="connsiteX78" fmla="*/ 6180992 w 7280031"/>
+              <a:gd name="connsiteY78" fmla="*/ 855002 h 863795"/>
+              <a:gd name="connsiteX79" fmla="*/ 6242538 w 7280031"/>
+              <a:gd name="connsiteY79" fmla="*/ 828625 h 863795"/>
+              <a:gd name="connsiteX80" fmla="*/ 6400800 w 7280031"/>
+              <a:gd name="connsiteY80" fmla="*/ 731910 h 863795"/>
+              <a:gd name="connsiteX81" fmla="*/ 6690946 w 7280031"/>
+              <a:gd name="connsiteY81" fmla="*/ 600025 h 863795"/>
+              <a:gd name="connsiteX82" fmla="*/ 6831623 w 7280031"/>
+              <a:gd name="connsiteY82" fmla="*/ 538479 h 863795"/>
+              <a:gd name="connsiteX83" fmla="*/ 6884377 w 7280031"/>
+              <a:gd name="connsiteY83" fmla="*/ 503310 h 863795"/>
+              <a:gd name="connsiteX84" fmla="*/ 6928338 w 7280031"/>
+              <a:gd name="connsiteY84" fmla="*/ 494518 h 863795"/>
+              <a:gd name="connsiteX85" fmla="*/ 7060223 w 7280031"/>
+              <a:gd name="connsiteY85" fmla="*/ 450556 h 863795"/>
+              <a:gd name="connsiteX86" fmla="*/ 7192108 w 7280031"/>
+              <a:gd name="connsiteY86" fmla="*/ 424179 h 863795"/>
+              <a:gd name="connsiteX87" fmla="*/ 7271238 w 7280031"/>
+              <a:gd name="connsiteY87" fmla="*/ 362633 h 863795"/>
+              <a:gd name="connsiteX88" fmla="*/ 7280031 w 7280031"/>
+              <a:gd name="connsiteY88" fmla="*/ 345048 h 863795"/>
+            </a:gdLst>
+            <a:ahLst/>
+            <a:cxnLst>
+              <a:cxn ang="0">
+                <a:pos x="connsiteX0" y="connsiteY0"/>
+              </a:cxn>
+              <a:cxn ang="0">
+                <a:pos x="connsiteX1" y="connsiteY1"/>
+              </a:cxn>
+              <a:cxn ang="0">
+                <a:pos x="connsiteX2" y="connsiteY2"/>
+              </a:cxn>
+              <a:cxn ang="0">
+                <a:pos x="connsiteX3" y="connsiteY3"/>
+              </a:cxn>
+              <a:cxn ang="0">
+                <a:pos x="connsiteX4" y="connsiteY4"/>
+              </a:cxn>
+              <a:cxn ang="0">
+                <a:pos x="connsiteX5" y="connsiteY5"/>
+              </a:cxn>
+              <a:cxn ang="0">
+                <a:pos x="connsiteX6" y="connsiteY6"/>
+              </a:cxn>
+              <a:cxn ang="0">
+                <a:pos x="connsiteX7" y="connsiteY7"/>
+              </a:cxn>
+              <a:cxn ang="0">
+                <a:pos x="connsiteX8" y="connsiteY8"/>
+              </a:cxn>
+              <a:cxn ang="0">
+                <a:pos x="connsiteX9" y="connsiteY9"/>
+              </a:cxn>
+              <a:cxn ang="0">
+                <a:pos x="connsiteX10" y="connsiteY10"/>
+              </a:cxn>
+              <a:cxn ang="0">
+                <a:pos x="connsiteX11" y="connsiteY11"/>
+              </a:cxn>
+              <a:cxn ang="0">
+                <a:pos x="connsiteX12" y="connsiteY12"/>
+              </a:cxn>
+              <a:cxn ang="0">
+                <a:pos x="connsiteX13" y="connsiteY13"/>
+              </a:cxn>
+              <a:cxn ang="0">
+                <a:pos x="connsiteX14" y="connsiteY14"/>
+              </a:cxn>
+              <a:cxn ang="0">
+                <a:pos x="connsiteX15" y="connsiteY15"/>
+              </a:cxn>
+              <a:cxn ang="0">
+                <a:pos x="connsiteX16" y="connsiteY16"/>
+              </a:cxn>
+              <a:cxn ang="0">
+                <a:pos x="connsiteX17" y="connsiteY17"/>
+              </a:cxn>
+              <a:cxn ang="0">
+                <a:pos x="connsiteX18" y="connsiteY18"/>
+              </a:cxn>
+              <a:cxn ang="0">
+                <a:pos x="connsiteX19" y="connsiteY19"/>
+              </a:cxn>
+              <a:cxn ang="0">
+                <a:pos x="connsiteX20" y="connsiteY20"/>
+              </a:cxn>
+              <a:cxn ang="0">
+                <a:pos x="connsiteX21" y="connsiteY21"/>
+              </a:cxn>
+              <a:cxn ang="0">
+                <a:pos x="connsiteX22" y="connsiteY22"/>
+              </a:cxn>
+              <a:cxn ang="0">
+                <a:pos x="connsiteX23" y="connsiteY23"/>
+              </a:cxn>
+              <a:cxn ang="0">
+                <a:pos x="connsiteX24" y="connsiteY24"/>
+              </a:cxn>
+              <a:cxn ang="0">
+                <a:pos x="connsiteX25" y="connsiteY25"/>
+              </a:cxn>
+              <a:cxn ang="0">
+                <a:pos x="connsiteX26" y="connsiteY26"/>
+              </a:cxn>
+              <a:cxn ang="0">
+                <a:pos x="connsiteX27" y="connsiteY27"/>
+              </a:cxn>
+              <a:cxn ang="0">
+                <a:pos x="connsiteX28" y="connsiteY28"/>
+              </a:cxn>
+              <a:cxn ang="0">
+                <a:pos x="connsiteX29" y="connsiteY29"/>
+              </a:cxn>
+              <a:cxn ang="0">
+                <a:pos x="connsiteX30" y="connsiteY30"/>
+              </a:cxn>
+              <a:cxn ang="0">
+                <a:pos x="connsiteX31" y="connsiteY31"/>
+              </a:cxn>
+              <a:cxn ang="0">
+                <a:pos x="connsiteX32" y="connsiteY32"/>
+              </a:cxn>
+              <a:cxn ang="0">
+                <a:pos x="connsiteX33" y="connsiteY33"/>
+              </a:cxn>
+              <a:cxn ang="0">
+                <a:pos x="connsiteX34" y="connsiteY34"/>
+              </a:cxn>
+              <a:cxn ang="0">
+                <a:pos x="connsiteX35" y="connsiteY35"/>
+              </a:cxn>
+              <a:cxn ang="0">
+                <a:pos x="connsiteX36" y="connsiteY36"/>
+              </a:cxn>
+              <a:cxn ang="0">
+                <a:pos x="connsiteX37" y="connsiteY37"/>
+              </a:cxn>
+              <a:cxn ang="0">
+                <a:pos x="connsiteX38" y="connsiteY38"/>
+              </a:cxn>
+              <a:cxn ang="0">
+                <a:pos x="connsiteX39" y="connsiteY39"/>
+              </a:cxn>
+              <a:cxn ang="0">
+                <a:pos x="connsiteX40" y="connsiteY40"/>
+              </a:cxn>
+              <a:cxn ang="0">
+                <a:pos x="connsiteX41" y="connsiteY41"/>
+              </a:cxn>
+              <a:cxn ang="0">
+                <a:pos x="connsiteX42" y="connsiteY42"/>
+              </a:cxn>
+              <a:cxn ang="0">
+                <a:pos x="connsiteX43" y="connsiteY43"/>
+              </a:cxn>
+              <a:cxn ang="0">
+                <a:pos x="connsiteX44" y="connsiteY44"/>
+              </a:cxn>
+              <a:cxn ang="0">
+                <a:pos x="connsiteX45" y="connsiteY45"/>
+              </a:cxn>
+              <a:cxn ang="0">
+                <a:pos x="connsiteX46" y="connsiteY46"/>
+              </a:cxn>
+              <a:cxn ang="0">
+                <a:pos x="connsiteX47" y="connsiteY47"/>
+              </a:cxn>
+              <a:cxn ang="0">
+                <a:pos x="connsiteX48" y="connsiteY48"/>
+              </a:cxn>
+              <a:cxn ang="0">
+                <a:pos x="connsiteX49" y="connsiteY49"/>
+              </a:cxn>
+              <a:cxn ang="0">
+                <a:pos x="connsiteX50" y="connsiteY50"/>
+              </a:cxn>
+              <a:cxn ang="0">
+                <a:pos x="connsiteX51" y="connsiteY51"/>
+              </a:cxn>
+              <a:cxn ang="0">
+                <a:pos x="connsiteX52" y="connsiteY52"/>
+              </a:cxn>
+              <a:cxn ang="0">
+                <a:pos x="connsiteX53" y="connsiteY53"/>
+              </a:cxn>
+              <a:cxn ang="0">
+                <a:pos x="connsiteX54" y="connsiteY54"/>
+              </a:cxn>
+              <a:cxn ang="0">
+                <a:pos x="connsiteX55" y="connsiteY55"/>
+              </a:cxn>
+              <a:cxn ang="0">
+                <a:pos x="connsiteX56" y="connsiteY56"/>
+              </a:cxn>
+              <a:cxn ang="0">
+                <a:pos x="connsiteX57" y="connsiteY57"/>
+              </a:cxn>
+              <a:cxn ang="0">
+                <a:pos x="connsiteX58" y="connsiteY58"/>
+              </a:cxn>
+              <a:cxn ang="0">
+                <a:pos x="connsiteX59" y="connsiteY59"/>
+              </a:cxn>
+              <a:cxn ang="0">
+                <a:pos x="connsiteX60" y="connsiteY60"/>
+              </a:cxn>
+              <a:cxn ang="0">
+                <a:pos x="connsiteX61" y="connsiteY61"/>
+              </a:cxn>
+              <a:cxn ang="0">
+                <a:pos x="connsiteX62" y="connsiteY62"/>
+              </a:cxn>
+              <a:cxn ang="0">
+                <a:pos x="connsiteX63" y="connsiteY63"/>
+              </a:cxn>
+              <a:cxn ang="0">
+                <a:pos x="connsiteX64" y="connsiteY64"/>
+              </a:cxn>
+              <a:cxn ang="0">
+                <a:pos x="connsiteX65" y="connsiteY65"/>
+              </a:cxn>
+              <a:cxn ang="0">
+                <a:pos x="connsiteX66" y="connsiteY66"/>
+              </a:cxn>
+              <a:cxn ang="0">
+                <a:pos x="connsiteX67" y="connsiteY67"/>
+              </a:cxn>
+              <a:cxn ang="0">
+                <a:pos x="connsiteX68" y="connsiteY68"/>
+              </a:cxn>
+              <a:cxn ang="0">
+                <a:pos x="connsiteX69" y="connsiteY69"/>
+              </a:cxn>
+              <a:cxn ang="0">
+                <a:pos x="connsiteX70" y="connsiteY70"/>
+              </a:cxn>
+              <a:cxn ang="0">
+                <a:pos x="connsiteX71" y="connsiteY71"/>
+              </a:cxn>
+              <a:cxn ang="0">
+                <a:pos x="connsiteX72" y="connsiteY72"/>
+              </a:cxn>
+              <a:cxn ang="0">
+                <a:pos x="connsiteX73" y="connsiteY73"/>
+              </a:cxn>
+              <a:cxn ang="0">
+                <a:pos x="connsiteX74" y="connsiteY74"/>
+              </a:cxn>
+              <a:cxn ang="0">
+                <a:pos x="connsiteX75" y="connsiteY75"/>
+              </a:cxn>
+              <a:cxn ang="0">
+                <a:pos x="connsiteX76" y="connsiteY76"/>
+              </a:cxn>
+              <a:cxn ang="0">
+                <a:pos x="connsiteX77" y="connsiteY77"/>
+              </a:cxn>
+              <a:cxn ang="0">
+                <a:pos x="connsiteX78" y="connsiteY78"/>
+              </a:cxn>
+              <a:cxn ang="0">
+                <a:pos x="connsiteX79" y="connsiteY79"/>
+              </a:cxn>
+              <a:cxn ang="0">
+                <a:pos x="connsiteX80" y="connsiteY80"/>
+              </a:cxn>
+              <a:cxn ang="0">
+                <a:pos x="connsiteX81" y="connsiteY81"/>
+              </a:cxn>
+              <a:cxn ang="0">
+                <a:pos x="connsiteX82" y="connsiteY82"/>
+              </a:cxn>
+              <a:cxn ang="0">
+                <a:pos x="connsiteX83" y="connsiteY83"/>
+              </a:cxn>
+              <a:cxn ang="0">
+                <a:pos x="connsiteX84" y="connsiteY84"/>
+              </a:cxn>
+              <a:cxn ang="0">
+                <a:pos x="connsiteX85" y="connsiteY85"/>
+              </a:cxn>
+              <a:cxn ang="0">
+                <a:pos x="connsiteX86" y="connsiteY86"/>
+              </a:cxn>
+              <a:cxn ang="0">
+                <a:pos x="connsiteX87" y="connsiteY87"/>
+              </a:cxn>
+              <a:cxn ang="0">
+                <a:pos x="connsiteX88" y="connsiteY88"/>
+              </a:cxn>
+            </a:cxnLst>
+            <a:rect l="l" t="t" r="r" b="b"/>
+            <a:pathLst>
+              <a:path w="7280031" h="863795">
+                <a:moveTo>
+                  <a:pt x="0" y="591233"/>
+                </a:moveTo>
+                <a:cubicBezTo>
+                  <a:pt x="20515" y="582441"/>
+                  <a:pt x="40085" y="570988"/>
+                  <a:pt x="61546" y="564856"/>
+                </a:cubicBezTo>
+                <a:cubicBezTo>
+                  <a:pt x="81472" y="559163"/>
+                  <a:pt x="102723" y="559883"/>
+                  <a:pt x="123092" y="556064"/>
+                </a:cubicBezTo>
+                <a:cubicBezTo>
+                  <a:pt x="149650" y="551084"/>
+                  <a:pt x="175533" y="542693"/>
+                  <a:pt x="202223" y="538479"/>
+                </a:cubicBezTo>
+                <a:cubicBezTo>
+                  <a:pt x="291470" y="524387"/>
+                  <a:pt x="484808" y="522735"/>
+                  <a:pt x="536331" y="520895"/>
+                </a:cubicBezTo>
+                <a:cubicBezTo>
+                  <a:pt x="559777" y="515033"/>
+                  <a:pt x="586560" y="516716"/>
+                  <a:pt x="606669" y="503310"/>
+                </a:cubicBezTo>
+                <a:cubicBezTo>
+                  <a:pt x="615461" y="497448"/>
+                  <a:pt x="623390" y="490017"/>
+                  <a:pt x="633046" y="485725"/>
+                </a:cubicBezTo>
+                <a:cubicBezTo>
+                  <a:pt x="669549" y="469502"/>
+                  <a:pt x="692156" y="466870"/>
+                  <a:pt x="729761" y="459348"/>
+                </a:cubicBezTo>
+                <a:lnTo>
+                  <a:pt x="1336431" y="468141"/>
+                </a:lnTo>
+                <a:cubicBezTo>
+                  <a:pt x="1476023" y="468141"/>
+                  <a:pt x="1449466" y="474423"/>
+                  <a:pt x="1521069" y="450556"/>
+                </a:cubicBezTo>
+                <a:cubicBezTo>
+                  <a:pt x="1586559" y="406895"/>
+                  <a:pt x="1506125" y="463010"/>
+                  <a:pt x="1573823" y="406595"/>
+                </a:cubicBezTo>
+                <a:cubicBezTo>
+                  <a:pt x="1597192" y="387121"/>
+                  <a:pt x="1608006" y="387061"/>
+                  <a:pt x="1635369" y="371425"/>
+                </a:cubicBezTo>
+                <a:cubicBezTo>
+                  <a:pt x="1644544" y="366182"/>
+                  <a:pt x="1652954" y="359702"/>
+                  <a:pt x="1661746" y="353841"/>
+                </a:cubicBezTo>
+                <a:cubicBezTo>
+                  <a:pt x="1667608" y="345049"/>
+                  <a:pt x="1671079" y="334065"/>
+                  <a:pt x="1679331" y="327464"/>
+                </a:cubicBezTo>
+                <a:cubicBezTo>
+                  <a:pt x="1686568" y="321674"/>
+                  <a:pt x="1697418" y="322816"/>
+                  <a:pt x="1705708" y="318671"/>
+                </a:cubicBezTo>
+                <a:cubicBezTo>
+                  <a:pt x="1766423" y="288314"/>
+                  <a:pt x="1694065" y="310592"/>
+                  <a:pt x="1767254" y="292295"/>
+                </a:cubicBezTo>
+                <a:cubicBezTo>
+                  <a:pt x="1817279" y="242270"/>
+                  <a:pt x="1765716" y="284079"/>
+                  <a:pt x="1837592" y="257125"/>
+                </a:cubicBezTo>
+                <a:cubicBezTo>
+                  <a:pt x="1847486" y="253415"/>
+                  <a:pt x="1854313" y="243833"/>
+                  <a:pt x="1863969" y="239541"/>
+                </a:cubicBezTo>
+                <a:cubicBezTo>
+                  <a:pt x="1880907" y="232013"/>
+                  <a:pt x="1916723" y="221956"/>
+                  <a:pt x="1916723" y="221956"/>
+                </a:cubicBezTo>
+                <a:cubicBezTo>
+                  <a:pt x="1922585" y="213164"/>
+                  <a:pt x="1925347" y="201180"/>
+                  <a:pt x="1934308" y="195579"/>
+                </a:cubicBezTo>
+                <a:cubicBezTo>
+                  <a:pt x="1950026" y="185755"/>
+                  <a:pt x="1987061" y="177995"/>
+                  <a:pt x="1987061" y="177995"/>
+                </a:cubicBezTo>
+                <a:cubicBezTo>
+                  <a:pt x="2014546" y="159671"/>
+                  <a:pt x="2025580" y="151711"/>
+                  <a:pt x="2057400" y="134033"/>
+                </a:cubicBezTo>
+                <a:cubicBezTo>
+                  <a:pt x="2068857" y="127668"/>
+                  <a:pt x="2080522" y="121611"/>
+                  <a:pt x="2092569" y="116448"/>
+                </a:cubicBezTo>
+                <a:cubicBezTo>
+                  <a:pt x="2121274" y="104146"/>
+                  <a:pt x="2124949" y="110904"/>
+                  <a:pt x="2154115" y="90071"/>
+                </a:cubicBezTo>
+                <a:cubicBezTo>
+                  <a:pt x="2164233" y="82844"/>
+                  <a:pt x="2170146" y="70592"/>
+                  <a:pt x="2180492" y="63695"/>
+                </a:cubicBezTo>
+                <a:cubicBezTo>
+                  <a:pt x="2188203" y="58554"/>
+                  <a:pt x="2198350" y="58553"/>
+                  <a:pt x="2206869" y="54902"/>
+                </a:cubicBezTo>
+                <a:cubicBezTo>
+                  <a:pt x="2271234" y="27317"/>
+                  <a:pt x="2212369" y="44736"/>
+                  <a:pt x="2277208" y="28525"/>
+                </a:cubicBezTo>
+                <a:cubicBezTo>
+                  <a:pt x="2351202" y="-20803"/>
+                  <a:pt x="2299780" y="5914"/>
+                  <a:pt x="2479431" y="19733"/>
+                </a:cubicBezTo>
+                <a:cubicBezTo>
+                  <a:pt x="2503075" y="21552"/>
+                  <a:pt x="2542701" y="30274"/>
+                  <a:pt x="2567354" y="37318"/>
+                </a:cubicBezTo>
+                <a:cubicBezTo>
+                  <a:pt x="2576265" y="39864"/>
+                  <a:pt x="2584939" y="43179"/>
+                  <a:pt x="2593731" y="46110"/>
+                </a:cubicBezTo>
+                <a:cubicBezTo>
+                  <a:pt x="2602523" y="51972"/>
+                  <a:pt x="2610656" y="58969"/>
+                  <a:pt x="2620108" y="63695"/>
+                </a:cubicBezTo>
+                <a:cubicBezTo>
+                  <a:pt x="2628397" y="67840"/>
+                  <a:pt x="2639932" y="65934"/>
+                  <a:pt x="2646485" y="72487"/>
+                </a:cubicBezTo>
+                <a:cubicBezTo>
+                  <a:pt x="2653038" y="79040"/>
+                  <a:pt x="2650136" y="91153"/>
+                  <a:pt x="2655277" y="98864"/>
+                </a:cubicBezTo>
+                <a:cubicBezTo>
+                  <a:pt x="2662174" y="109210"/>
+                  <a:pt x="2672102" y="117281"/>
+                  <a:pt x="2681654" y="125241"/>
+                </a:cubicBezTo>
+                <a:cubicBezTo>
+                  <a:pt x="2700292" y="140773"/>
+                  <a:pt x="2721705" y="149662"/>
+                  <a:pt x="2743200" y="160410"/>
+                </a:cubicBezTo>
+                <a:cubicBezTo>
+                  <a:pt x="2762382" y="217959"/>
+                  <a:pt x="2735740" y="161476"/>
+                  <a:pt x="2778369" y="195579"/>
+                </a:cubicBezTo>
+                <a:cubicBezTo>
+                  <a:pt x="2786621" y="202180"/>
+                  <a:pt x="2789189" y="213838"/>
+                  <a:pt x="2795954" y="221956"/>
+                </a:cubicBezTo>
+                <a:cubicBezTo>
+                  <a:pt x="2803914" y="231508"/>
+                  <a:pt x="2812779" y="240373"/>
+                  <a:pt x="2822331" y="248333"/>
+                </a:cubicBezTo>
+                <a:cubicBezTo>
+                  <a:pt x="2840974" y="263869"/>
+                  <a:pt x="2862375" y="272751"/>
+                  <a:pt x="2883877" y="283502"/>
+                </a:cubicBezTo>
+                <a:cubicBezTo>
+                  <a:pt x="2930159" y="329784"/>
+                  <a:pt x="2887610" y="294161"/>
+                  <a:pt x="2954215" y="327464"/>
+                </a:cubicBezTo>
+                <a:cubicBezTo>
+                  <a:pt x="2963666" y="332190"/>
+                  <a:pt x="2971141" y="340322"/>
+                  <a:pt x="2980592" y="345048"/>
+                </a:cubicBezTo>
+                <a:cubicBezTo>
+                  <a:pt x="2994709" y="352106"/>
+                  <a:pt x="3010757" y="354968"/>
+                  <a:pt x="3024554" y="362633"/>
+                </a:cubicBezTo>
+                <a:cubicBezTo>
+                  <a:pt x="3046774" y="374978"/>
+                  <a:pt x="3058700" y="396768"/>
+                  <a:pt x="3086100" y="397802"/>
+                </a:cubicBezTo>
+                <a:cubicBezTo>
+                  <a:pt x="3232563" y="403329"/>
+                  <a:pt x="3379177" y="403664"/>
+                  <a:pt x="3525715" y="406595"/>
+                </a:cubicBezTo>
+                <a:cubicBezTo>
+                  <a:pt x="3548916" y="413224"/>
+                  <a:pt x="3612576" y="433917"/>
+                  <a:pt x="3640015" y="432971"/>
+                </a:cubicBezTo>
+                <a:cubicBezTo>
+                  <a:pt x="3707637" y="430639"/>
+                  <a:pt x="3774830" y="421248"/>
+                  <a:pt x="3842238" y="415387"/>
+                </a:cubicBezTo>
+                <a:cubicBezTo>
+                  <a:pt x="3853961" y="406595"/>
+                  <a:pt x="3864543" y="396027"/>
+                  <a:pt x="3877408" y="389010"/>
+                </a:cubicBezTo>
+                <a:cubicBezTo>
+                  <a:pt x="3897003" y="378322"/>
+                  <a:pt x="3920903" y="375761"/>
+                  <a:pt x="3938954" y="362633"/>
+                </a:cubicBezTo>
+                <a:cubicBezTo>
+                  <a:pt x="3954131" y="351595"/>
+                  <a:pt x="3960097" y="331138"/>
+                  <a:pt x="3974123" y="318671"/>
+                </a:cubicBezTo>
+                <a:cubicBezTo>
+                  <a:pt x="3986896" y="307318"/>
+                  <a:pt x="4003668" y="301470"/>
+                  <a:pt x="4018085" y="292295"/>
+                </a:cubicBezTo>
+                <a:cubicBezTo>
+                  <a:pt x="4035915" y="280949"/>
+                  <a:pt x="4053008" y="268471"/>
+                  <a:pt x="4070838" y="257125"/>
+                </a:cubicBezTo>
+                <a:cubicBezTo>
+                  <a:pt x="4085256" y="247950"/>
+                  <a:pt x="4100581" y="240227"/>
+                  <a:pt x="4114800" y="230748"/>
+                </a:cubicBezTo>
+                <a:cubicBezTo>
+                  <a:pt x="4164735" y="197458"/>
+                  <a:pt x="4143916" y="199928"/>
+                  <a:pt x="4211515" y="169202"/>
+                </a:cubicBezTo>
+                <a:cubicBezTo>
+                  <a:pt x="4222516" y="164202"/>
+                  <a:pt x="4235135" y="163964"/>
+                  <a:pt x="4246685" y="160410"/>
+                </a:cubicBezTo>
+                <a:cubicBezTo>
+                  <a:pt x="4273259" y="152233"/>
+                  <a:pt x="4298842" y="140776"/>
+                  <a:pt x="4325815" y="134033"/>
+                </a:cubicBezTo>
+                <a:cubicBezTo>
+                  <a:pt x="4381684" y="120066"/>
+                  <a:pt x="4349366" y="128561"/>
+                  <a:pt x="4422531" y="107656"/>
+                </a:cubicBezTo>
+                <a:cubicBezTo>
+                  <a:pt x="4501662" y="116448"/>
+                  <a:pt x="4581321" y="121355"/>
+                  <a:pt x="4659923" y="134033"/>
+                </a:cubicBezTo>
+                <a:cubicBezTo>
+                  <a:pt x="4672981" y="136139"/>
+                  <a:pt x="4732612" y="175022"/>
+                  <a:pt x="4739054" y="177995"/>
+                </a:cubicBezTo>
+                <a:cubicBezTo>
+                  <a:pt x="4797412" y="204929"/>
+                  <a:pt x="4815684" y="200995"/>
+                  <a:pt x="4870938" y="230748"/>
+                </a:cubicBezTo>
+                <a:cubicBezTo>
+                  <a:pt x="4969192" y="283655"/>
+                  <a:pt x="4887071" y="253711"/>
+                  <a:pt x="4950069" y="274710"/>
+                </a:cubicBezTo>
+                <a:cubicBezTo>
+                  <a:pt x="4958861" y="283502"/>
+                  <a:pt x="4966100" y="294190"/>
+                  <a:pt x="4976446" y="301087"/>
+                </a:cubicBezTo>
+                <a:cubicBezTo>
+                  <a:pt x="4984157" y="306228"/>
+                  <a:pt x="4995586" y="304089"/>
+                  <a:pt x="5002823" y="309879"/>
+                </a:cubicBezTo>
+                <a:cubicBezTo>
+                  <a:pt x="5011075" y="316480"/>
+                  <a:pt x="5013268" y="328466"/>
+                  <a:pt x="5020408" y="336256"/>
+                </a:cubicBezTo>
+                <a:cubicBezTo>
+                  <a:pt x="5045614" y="363754"/>
+                  <a:pt x="5073161" y="389010"/>
+                  <a:pt x="5099538" y="415387"/>
+                </a:cubicBezTo>
+                <a:lnTo>
+                  <a:pt x="5125915" y="441764"/>
+                </a:lnTo>
+                <a:cubicBezTo>
+                  <a:pt x="5134707" y="450556"/>
+                  <a:pt x="5142236" y="460828"/>
+                  <a:pt x="5152292" y="468141"/>
+                </a:cubicBezTo>
+                <a:cubicBezTo>
+                  <a:pt x="5184531" y="491587"/>
+                  <a:pt x="5217542" y="514005"/>
+                  <a:pt x="5249008" y="538479"/>
+                </a:cubicBezTo>
+                <a:lnTo>
+                  <a:pt x="5328138" y="600025"/>
+                </a:lnTo>
+                <a:cubicBezTo>
+                  <a:pt x="5372899" y="674627"/>
+                  <a:pt x="5330269" y="619209"/>
+                  <a:pt x="5398477" y="670364"/>
+                </a:cubicBezTo>
+                <a:cubicBezTo>
+                  <a:pt x="5456674" y="714012"/>
+                  <a:pt x="5393816" y="681517"/>
+                  <a:pt x="5451231" y="714325"/>
+                </a:cubicBezTo>
+                <a:cubicBezTo>
+                  <a:pt x="5462611" y="720828"/>
+                  <a:pt x="5473966" y="727765"/>
+                  <a:pt x="5486400" y="731910"/>
+                </a:cubicBezTo>
+                <a:cubicBezTo>
+                  <a:pt x="5518219" y="742517"/>
+                  <a:pt x="5565823" y="751312"/>
+                  <a:pt x="5600700" y="758287"/>
+                </a:cubicBezTo>
+                <a:cubicBezTo>
+                  <a:pt x="5609492" y="764148"/>
+                  <a:pt x="5617626" y="771145"/>
+                  <a:pt x="5627077" y="775871"/>
+                </a:cubicBezTo>
+                <a:cubicBezTo>
+                  <a:pt x="5641857" y="783261"/>
+                  <a:pt x="5674529" y="789228"/>
+                  <a:pt x="5688623" y="793456"/>
+                </a:cubicBezTo>
+                <a:lnTo>
+                  <a:pt x="5794131" y="828625"/>
+                </a:lnTo>
+                <a:lnTo>
+                  <a:pt x="5846885" y="837418"/>
+                </a:lnTo>
+                <a:cubicBezTo>
+                  <a:pt x="5867368" y="840569"/>
+                  <a:pt x="5887961" y="842978"/>
+                  <a:pt x="5908431" y="846210"/>
+                </a:cubicBezTo>
+                <a:lnTo>
+                  <a:pt x="6013938" y="863795"/>
+                </a:lnTo>
+                <a:cubicBezTo>
+                  <a:pt x="6069623" y="860864"/>
+                  <a:pt x="6125879" y="863481"/>
+                  <a:pt x="6180992" y="855002"/>
+                </a:cubicBezTo>
+                <a:cubicBezTo>
+                  <a:pt x="6203052" y="851608"/>
+                  <a:pt x="6222574" y="838607"/>
+                  <a:pt x="6242538" y="828625"/>
+                </a:cubicBezTo>
+                <a:cubicBezTo>
+                  <a:pt x="6483363" y="708214"/>
+                  <a:pt x="6155800" y="865547"/>
+                  <a:pt x="6400800" y="731910"/>
+                </a:cubicBezTo>
+                <a:cubicBezTo>
+                  <a:pt x="6762263" y="534748"/>
+                  <a:pt x="6492811" y="679279"/>
+                  <a:pt x="6690946" y="600025"/>
+                </a:cubicBezTo>
+                <a:cubicBezTo>
+                  <a:pt x="6738469" y="581016"/>
+                  <a:pt x="6789035" y="566870"/>
+                  <a:pt x="6831623" y="538479"/>
+                </a:cubicBezTo>
+                <a:cubicBezTo>
+                  <a:pt x="6849208" y="526756"/>
+                  <a:pt x="6865137" y="512055"/>
+                  <a:pt x="6884377" y="503310"/>
+                </a:cubicBezTo>
+                <a:cubicBezTo>
+                  <a:pt x="6897981" y="497126"/>
+                  <a:pt x="6914024" y="498812"/>
+                  <a:pt x="6928338" y="494518"/>
+                </a:cubicBezTo>
+                <a:cubicBezTo>
+                  <a:pt x="6972723" y="481202"/>
+                  <a:pt x="7015267" y="461795"/>
+                  <a:pt x="7060223" y="450556"/>
+                </a:cubicBezTo>
+                <a:cubicBezTo>
+                  <a:pt x="7150666" y="427945"/>
+                  <a:pt x="7106636" y="436389"/>
+                  <a:pt x="7192108" y="424179"/>
+                </a:cubicBezTo>
+                <a:cubicBezTo>
+                  <a:pt x="7225109" y="402178"/>
+                  <a:pt x="7247626" y="392148"/>
+                  <a:pt x="7271238" y="362633"/>
+                </a:cubicBezTo>
+                <a:cubicBezTo>
+                  <a:pt x="7275332" y="357516"/>
+                  <a:pt x="7277100" y="350910"/>
+                  <a:pt x="7280031" y="345048"/>
+                </a:cubicBezTo>
+              </a:path>
+            </a:pathLst>
+          </a:custGeom>
+          <a:noFill/>
+          <a:ln w="28575">
+            <a:solidFill>
+              <a:srgbClr val="F24848"/>
+            </a:solidFill>
+          </a:ln>
+        </p:spPr>
+        <p:style>
+          <a:lnRef idx="2">
+            <a:schemeClr val="accent1">
+              <a:shade val="50000"/>
+            </a:schemeClr>
+          </a:lnRef>
+          <a:fillRef idx="1">
+            <a:schemeClr val="accent1"/>
+          </a:fillRef>
+          <a:effectRef idx="0">
+            <a:schemeClr val="accent1"/>
+          </a:effectRef>
+          <a:fontRef idx="minor">
+            <a:schemeClr val="lt1"/>
+          </a:fontRef>
+        </p:style>
+        <p:txBody>
+          <a:bodyPr rtlCol="0" anchor="ctr"/>
+          <a:lstStyle/>
+          <a:p>
+            <a:pPr algn="ctr"/>
+            <a:endParaRPr lang="en-US"/>
+          </a:p>
+        </p:txBody>
+      </p:sp>
+      <p:sp>
+        <p:nvSpPr>
+          <p:cNvPr id="36" name="TextBox 35">
+            <a:extLst>
+              <a:ext uri="{FF2B5EF4-FFF2-40B4-BE49-F238E27FC236}">
+                <a16:creationId xmlns:a16="http://schemas.microsoft.com/office/drawing/2014/main" id="{C616E99C-15D0-476D-B3ED-79D6C0902F0F}"/>
+              </a:ext>
+            </a:extLst>
+          </p:cNvPr>
+          <p:cNvSpPr txBox="1"/>
+          <p:nvPr/>
+        </p:nvSpPr>
+        <p:spPr>
+          <a:xfrm>
+            <a:off x="1597204" y="3149462"/>
+            <a:ext cx="2415085" cy="2308324"/>
+          </a:xfrm>
+          <a:prstGeom prst="rect">
+            <a:avLst/>
+          </a:prstGeom>
+          <a:noFill/>
+        </p:spPr>
+        <p:txBody>
+          <a:bodyPr wrap="none" rtlCol="0">
+            <a:spAutoFit/>
+          </a:bodyPr>
+          <a:lstStyle/>
+          <a:p>
+            <a:r>
+              <a:rPr lang="en-US" dirty="0" err="1"/>
+              <a:t>score_gates</a:t>
+            </a:r>
+            <a:r>
+              <a:rPr lang="en-US" dirty="0"/>
+              <a:t> = []</a:t>
+            </a:r>
+          </a:p>
+          <a:p>
+            <a:pPr marL="285750" indent="-285750">
+              <a:buFont typeface="Arial" panose="020B0604020202020204" pitchFamily="34" charset="0"/>
+              <a:buChar char="•"/>
+            </a:pPr>
+            <a:r>
+              <a:rPr lang="en-US" dirty="0" err="1"/>
+              <a:t>Start_xy</a:t>
+            </a:r>
+            <a:endParaRPr lang="en-US" dirty="0"/>
+          </a:p>
+          <a:p>
+            <a:pPr marL="285750" indent="-285750">
+              <a:buFont typeface="Arial" panose="020B0604020202020204" pitchFamily="34" charset="0"/>
+              <a:buChar char="•"/>
+            </a:pPr>
+            <a:r>
+              <a:rPr lang="en-US" dirty="0"/>
+              <a:t>Azimuth</a:t>
+            </a:r>
+          </a:p>
+          <a:p>
+            <a:pPr marL="285750" indent="-285750">
+              <a:buFont typeface="Arial" panose="020B0604020202020204" pitchFamily="34" charset="0"/>
+              <a:buChar char="•"/>
+            </a:pPr>
+            <a:r>
+              <a:rPr lang="en-US" dirty="0" err="1"/>
+              <a:t>Downline_length</a:t>
+            </a:r>
+            <a:endParaRPr lang="en-US" dirty="0"/>
+          </a:p>
+          <a:p>
+            <a:pPr marL="285750" indent="-285750">
+              <a:buFont typeface="Arial" panose="020B0604020202020204" pitchFamily="34" charset="0"/>
+              <a:buChar char="•"/>
+            </a:pPr>
+            <a:r>
+              <a:rPr lang="en-US" dirty="0" err="1"/>
+              <a:t>Offline_width</a:t>
+            </a:r>
+            <a:endParaRPr lang="en-US" dirty="0"/>
+          </a:p>
+          <a:p>
+            <a:pPr marL="285750" indent="-285750">
+              <a:buFont typeface="Arial" panose="020B0604020202020204" pitchFamily="34" charset="0"/>
+              <a:buChar char="•"/>
+            </a:pPr>
+            <a:r>
+              <a:rPr lang="en-US" dirty="0" err="1"/>
+              <a:t>Offline_error_thresh</a:t>
+            </a:r>
+            <a:endParaRPr lang="en-US" dirty="0"/>
+          </a:p>
+          <a:p>
+            <a:pPr marL="285750" indent="-285750">
+              <a:buFont typeface="Arial" panose="020B0604020202020204" pitchFamily="34" charset="0"/>
+              <a:buChar char="•"/>
+            </a:pPr>
+            <a:r>
+              <a:rPr lang="en-US" dirty="0" err="1"/>
+              <a:t>Speed_error_thresh</a:t>
+            </a:r>
+            <a:endParaRPr lang="en-US" dirty="0"/>
+          </a:p>
+          <a:p>
+            <a:pPr marL="285750" indent="-285750">
+              <a:buFont typeface="Arial" panose="020B0604020202020204" pitchFamily="34" charset="0"/>
+              <a:buChar char="•"/>
+            </a:pPr>
+            <a:r>
+              <a:rPr lang="en-US" dirty="0"/>
+              <a:t>	</a:t>
+            </a:r>
+          </a:p>
+        </p:txBody>
+      </p:sp>
+      <p:sp>
+        <p:nvSpPr>
+          <p:cNvPr id="38" name="TextBox 37">
+            <a:extLst>
+              <a:ext uri="{FF2B5EF4-FFF2-40B4-BE49-F238E27FC236}">
+                <a16:creationId xmlns:a16="http://schemas.microsoft.com/office/drawing/2014/main" id="{EDF221FF-75DF-4E8D-8C6B-B84066302D43}"/>
+              </a:ext>
+            </a:extLst>
+          </p:cNvPr>
+          <p:cNvSpPr txBox="1"/>
+          <p:nvPr/>
+        </p:nvSpPr>
+        <p:spPr>
+          <a:xfrm rot="20722961">
+            <a:off x="7865329" y="631186"/>
+            <a:ext cx="1801199" cy="369332"/>
+          </a:xfrm>
+          <a:prstGeom prst="rect">
+            <a:avLst/>
+          </a:prstGeom>
+          <a:noFill/>
+        </p:spPr>
+        <p:txBody>
+          <a:bodyPr wrap="none" rtlCol="0">
+            <a:spAutoFit/>
+          </a:bodyPr>
+          <a:lstStyle/>
+          <a:p>
+            <a:r>
+              <a:rPr lang="en-US" dirty="0"/>
+              <a:t>no skipping gates</a:t>
+            </a:r>
           </a:p>
         </p:txBody>
       </p:sp>
     </p:spTree>
     <p:extLst>
       <p:ext uri="{BB962C8B-B14F-4D97-AF65-F5344CB8AC3E}">
-        <p14:creationId xmlns:p14="http://schemas.microsoft.com/office/powerpoint/2010/main" val="1297506879"/>
+        <p14:creationId xmlns:p14="http://schemas.microsoft.com/office/powerpoint/2010/main" val="1524758525"/>
       </p:ext>
     </p:extLst>
   </p:cSld>

</xml_diff>